<commit_message>
Adicionada apresentação SD. Atualiza projetos
</commit_message>
<xml_diff>
--- a/projects/02-websocket-chat-nodejs/websocket.pptx
+++ b/projects/02-websocket-chat-nodejs/websocket.pptx
@@ -271,7 +271,7 @@
           <a:p>
             <a:fld id="{A74A3E01-8C82-1244-BAF0-CA56415AE545}" type="datetimeFigureOut">
               <a:rPr lang="pt-BR" smtClean="0"/>
-              <a:t>03/12/2018</a:t>
+              <a:t>19/02/2019</a:t>
             </a:fld>
             <a:endParaRPr lang="pt-BR"/>
           </a:p>
@@ -441,7 +441,7 @@
           <a:p>
             <a:fld id="{A74A3E01-8C82-1244-BAF0-CA56415AE545}" type="datetimeFigureOut">
               <a:rPr lang="pt-BR" smtClean="0"/>
-              <a:t>03/12/2018</a:t>
+              <a:t>19/02/2019</a:t>
             </a:fld>
             <a:endParaRPr lang="pt-BR"/>
           </a:p>
@@ -621,7 +621,7 @@
           <a:p>
             <a:fld id="{A74A3E01-8C82-1244-BAF0-CA56415AE545}" type="datetimeFigureOut">
               <a:rPr lang="pt-BR" smtClean="0"/>
-              <a:t>03/12/2018</a:t>
+              <a:t>19/02/2019</a:t>
             </a:fld>
             <a:endParaRPr lang="pt-BR"/>
           </a:p>
@@ -791,7 +791,7 @@
           <a:p>
             <a:fld id="{A74A3E01-8C82-1244-BAF0-CA56415AE545}" type="datetimeFigureOut">
               <a:rPr lang="pt-BR" smtClean="0"/>
-              <a:t>03/12/2018</a:t>
+              <a:t>19/02/2019</a:t>
             </a:fld>
             <a:endParaRPr lang="pt-BR"/>
           </a:p>
@@ -1051,7 +1051,7 @@
           <a:p>
             <a:fld id="{A74A3E01-8C82-1244-BAF0-CA56415AE545}" type="datetimeFigureOut">
               <a:rPr lang="pt-BR" smtClean="0"/>
-              <a:t>03/12/2018</a:t>
+              <a:t>19/02/2019</a:t>
             </a:fld>
             <a:endParaRPr lang="pt-BR"/>
           </a:p>
@@ -1283,7 +1283,7 @@
           <a:p>
             <a:fld id="{A74A3E01-8C82-1244-BAF0-CA56415AE545}" type="datetimeFigureOut">
               <a:rPr lang="pt-BR" smtClean="0"/>
-              <a:t>03/12/2018</a:t>
+              <a:t>19/02/2019</a:t>
             </a:fld>
             <a:endParaRPr lang="pt-BR"/>
           </a:p>
@@ -1638,7 +1638,7 @@
           <a:p>
             <a:fld id="{A74A3E01-8C82-1244-BAF0-CA56415AE545}" type="datetimeFigureOut">
               <a:rPr lang="pt-BR" smtClean="0"/>
-              <a:t>03/12/2018</a:t>
+              <a:t>19/02/2019</a:t>
             </a:fld>
             <a:endParaRPr lang="pt-BR"/>
           </a:p>
@@ -1779,7 +1779,7 @@
           <a:p>
             <a:fld id="{A74A3E01-8C82-1244-BAF0-CA56415AE545}" type="datetimeFigureOut">
               <a:rPr lang="pt-BR" smtClean="0"/>
-              <a:t>03/12/2018</a:t>
+              <a:t>19/02/2019</a:t>
             </a:fld>
             <a:endParaRPr lang="pt-BR"/>
           </a:p>
@@ -1874,7 +1874,7 @@
           <a:p>
             <a:fld id="{A74A3E01-8C82-1244-BAF0-CA56415AE545}" type="datetimeFigureOut">
               <a:rPr lang="pt-BR" smtClean="0"/>
-              <a:t>03/12/2018</a:t>
+              <a:t>19/02/2019</a:t>
             </a:fld>
             <a:endParaRPr lang="pt-BR"/>
           </a:p>
@@ -2231,7 +2231,7 @@
           <a:p>
             <a:fld id="{A74A3E01-8C82-1244-BAF0-CA56415AE545}" type="datetimeFigureOut">
               <a:rPr lang="pt-BR" smtClean="0"/>
-              <a:t>03/12/2018</a:t>
+              <a:t>19/02/2019</a:t>
             </a:fld>
             <a:endParaRPr lang="pt-BR"/>
           </a:p>
@@ -2549,7 +2549,7 @@
           <a:p>
             <a:fld id="{A74A3E01-8C82-1244-BAF0-CA56415AE545}" type="datetimeFigureOut">
               <a:rPr lang="pt-BR" smtClean="0"/>
-              <a:t>03/12/2018</a:t>
+              <a:t>19/02/2019</a:t>
             </a:fld>
             <a:endParaRPr lang="pt-BR"/>
           </a:p>
@@ -2793,7 +2793,7 @@
           <a:p>
             <a:fld id="{A74A3E01-8C82-1244-BAF0-CA56415AE545}" type="datetimeFigureOut">
               <a:rPr lang="pt-BR" smtClean="0"/>
-              <a:t>03/12/2018</a:t>
+              <a:t>19/02/2019</a:t>
             </a:fld>
             <a:endParaRPr lang="pt-BR"/>
           </a:p>
@@ -4771,7 +4771,7 @@
             </a:r>
             <a:r>
               <a:rPr lang="en-US" sz="3200" dirty="0"/>
-              <a:t> e </a:t>
+              <a:t>, </a:t>
             </a:r>
             <a:r>
               <a:rPr lang="en-US" sz="3200" dirty="0" err="1"/>

</xml_diff>

<commit_message>
Atualiza projeto WebSocket com NodeJS e socket.io
</commit_message>
<xml_diff>
--- a/projects/02-websocket-chat-nodejs/websocket.pptx
+++ b/projects/02-websocket-chat-nodejs/websocket.pptx
@@ -271,7 +271,7 @@
           <a:p>
             <a:fld id="{A74A3E01-8C82-1244-BAF0-CA56415AE545}" type="datetimeFigureOut">
               <a:rPr lang="pt-BR" smtClean="0"/>
-              <a:t>19/02/2019</a:t>
+              <a:t>16/04/2019</a:t>
             </a:fld>
             <a:endParaRPr lang="pt-BR"/>
           </a:p>
@@ -441,7 +441,7 @@
           <a:p>
             <a:fld id="{A74A3E01-8C82-1244-BAF0-CA56415AE545}" type="datetimeFigureOut">
               <a:rPr lang="pt-BR" smtClean="0"/>
-              <a:t>19/02/2019</a:t>
+              <a:t>16/04/2019</a:t>
             </a:fld>
             <a:endParaRPr lang="pt-BR"/>
           </a:p>
@@ -621,7 +621,7 @@
           <a:p>
             <a:fld id="{A74A3E01-8C82-1244-BAF0-CA56415AE545}" type="datetimeFigureOut">
               <a:rPr lang="pt-BR" smtClean="0"/>
-              <a:t>19/02/2019</a:t>
+              <a:t>16/04/2019</a:t>
             </a:fld>
             <a:endParaRPr lang="pt-BR"/>
           </a:p>
@@ -791,7 +791,7 @@
           <a:p>
             <a:fld id="{A74A3E01-8C82-1244-BAF0-CA56415AE545}" type="datetimeFigureOut">
               <a:rPr lang="pt-BR" smtClean="0"/>
-              <a:t>19/02/2019</a:t>
+              <a:t>16/04/2019</a:t>
             </a:fld>
             <a:endParaRPr lang="pt-BR"/>
           </a:p>
@@ -1051,7 +1051,7 @@
           <a:p>
             <a:fld id="{A74A3E01-8C82-1244-BAF0-CA56415AE545}" type="datetimeFigureOut">
               <a:rPr lang="pt-BR" smtClean="0"/>
-              <a:t>19/02/2019</a:t>
+              <a:t>16/04/2019</a:t>
             </a:fld>
             <a:endParaRPr lang="pt-BR"/>
           </a:p>
@@ -1283,7 +1283,7 @@
           <a:p>
             <a:fld id="{A74A3E01-8C82-1244-BAF0-CA56415AE545}" type="datetimeFigureOut">
               <a:rPr lang="pt-BR" smtClean="0"/>
-              <a:t>19/02/2019</a:t>
+              <a:t>16/04/2019</a:t>
             </a:fld>
             <a:endParaRPr lang="pt-BR"/>
           </a:p>
@@ -1638,7 +1638,7 @@
           <a:p>
             <a:fld id="{A74A3E01-8C82-1244-BAF0-CA56415AE545}" type="datetimeFigureOut">
               <a:rPr lang="pt-BR" smtClean="0"/>
-              <a:t>19/02/2019</a:t>
+              <a:t>16/04/2019</a:t>
             </a:fld>
             <a:endParaRPr lang="pt-BR"/>
           </a:p>
@@ -1779,7 +1779,7 @@
           <a:p>
             <a:fld id="{A74A3E01-8C82-1244-BAF0-CA56415AE545}" type="datetimeFigureOut">
               <a:rPr lang="pt-BR" smtClean="0"/>
-              <a:t>19/02/2019</a:t>
+              <a:t>16/04/2019</a:t>
             </a:fld>
             <a:endParaRPr lang="pt-BR"/>
           </a:p>
@@ -1874,7 +1874,7 @@
           <a:p>
             <a:fld id="{A74A3E01-8C82-1244-BAF0-CA56415AE545}" type="datetimeFigureOut">
               <a:rPr lang="pt-BR" smtClean="0"/>
-              <a:t>19/02/2019</a:t>
+              <a:t>16/04/2019</a:t>
             </a:fld>
             <a:endParaRPr lang="pt-BR"/>
           </a:p>
@@ -2231,7 +2231,7 @@
           <a:p>
             <a:fld id="{A74A3E01-8C82-1244-BAF0-CA56415AE545}" type="datetimeFigureOut">
               <a:rPr lang="pt-BR" smtClean="0"/>
-              <a:t>19/02/2019</a:t>
+              <a:t>16/04/2019</a:t>
             </a:fld>
             <a:endParaRPr lang="pt-BR"/>
           </a:p>
@@ -2549,7 +2549,7 @@
           <a:p>
             <a:fld id="{A74A3E01-8C82-1244-BAF0-CA56415AE545}" type="datetimeFigureOut">
               <a:rPr lang="pt-BR" smtClean="0"/>
-              <a:t>19/02/2019</a:t>
+              <a:t>16/04/2019</a:t>
             </a:fld>
             <a:endParaRPr lang="pt-BR"/>
           </a:p>
@@ -2793,7 +2793,7 @@
           <a:p>
             <a:fld id="{A74A3E01-8C82-1244-BAF0-CA56415AE545}" type="datetimeFigureOut">
               <a:rPr lang="pt-BR" smtClean="0"/>
-              <a:t>19/02/2019</a:t>
+              <a:t>16/04/2019</a:t>
             </a:fld>
             <a:endParaRPr lang="pt-BR"/>
           </a:p>

</xml_diff>

<commit_message>
Atualiza apresentação de WebSocket
- Mostra que ser amigável a firewalls não
  é apenas uma questão de usar a porta 80
- Fala sobre ferramentas de Deep Packet Inspection
</commit_message>
<xml_diff>
--- a/projects/02-websocket-chat-nodejs/websocket.pptx
+++ b/projects/02-websocket-chat-nodejs/websocket.pptx
@@ -9,7 +9,11 @@
     <p:sldId id="259" r:id="rId3"/>
     <p:sldId id="258" r:id="rId4"/>
     <p:sldId id="260" r:id="rId5"/>
-    <p:sldId id="256" r:id="rId6"/>
+    <p:sldId id="261" r:id="rId6"/>
+    <p:sldId id="262" r:id="rId7"/>
+    <p:sldId id="263" r:id="rId8"/>
+    <p:sldId id="264" r:id="rId9"/>
+    <p:sldId id="256" r:id="rId10"/>
   </p:sldIdLst>
   <p:sldSz cx="12192000" cy="6858000"/>
   <p:notesSz cx="6858000" cy="9144000"/>
@@ -271,7 +275,7 @@
           <a:p>
             <a:fld id="{A74A3E01-8C82-1244-BAF0-CA56415AE545}" type="datetimeFigureOut">
               <a:rPr lang="pt-BR" smtClean="0"/>
-              <a:t>16/04/2019</a:t>
+              <a:t>22/04/2019</a:t>
             </a:fld>
             <a:endParaRPr lang="pt-BR"/>
           </a:p>
@@ -441,7 +445,7 @@
           <a:p>
             <a:fld id="{A74A3E01-8C82-1244-BAF0-CA56415AE545}" type="datetimeFigureOut">
               <a:rPr lang="pt-BR" smtClean="0"/>
-              <a:t>16/04/2019</a:t>
+              <a:t>22/04/2019</a:t>
             </a:fld>
             <a:endParaRPr lang="pt-BR"/>
           </a:p>
@@ -621,7 +625,7 @@
           <a:p>
             <a:fld id="{A74A3E01-8C82-1244-BAF0-CA56415AE545}" type="datetimeFigureOut">
               <a:rPr lang="pt-BR" smtClean="0"/>
-              <a:t>16/04/2019</a:t>
+              <a:t>22/04/2019</a:t>
             </a:fld>
             <a:endParaRPr lang="pt-BR"/>
           </a:p>
@@ -791,7 +795,7 @@
           <a:p>
             <a:fld id="{A74A3E01-8C82-1244-BAF0-CA56415AE545}" type="datetimeFigureOut">
               <a:rPr lang="pt-BR" smtClean="0"/>
-              <a:t>16/04/2019</a:t>
+              <a:t>22/04/2019</a:t>
             </a:fld>
             <a:endParaRPr lang="pt-BR"/>
           </a:p>
@@ -1051,7 +1055,7 @@
           <a:p>
             <a:fld id="{A74A3E01-8C82-1244-BAF0-CA56415AE545}" type="datetimeFigureOut">
               <a:rPr lang="pt-BR" smtClean="0"/>
-              <a:t>16/04/2019</a:t>
+              <a:t>22/04/2019</a:t>
             </a:fld>
             <a:endParaRPr lang="pt-BR"/>
           </a:p>
@@ -1283,7 +1287,7 @@
           <a:p>
             <a:fld id="{A74A3E01-8C82-1244-BAF0-CA56415AE545}" type="datetimeFigureOut">
               <a:rPr lang="pt-BR" smtClean="0"/>
-              <a:t>16/04/2019</a:t>
+              <a:t>22/04/2019</a:t>
             </a:fld>
             <a:endParaRPr lang="pt-BR"/>
           </a:p>
@@ -1638,7 +1642,7 @@
           <a:p>
             <a:fld id="{A74A3E01-8C82-1244-BAF0-CA56415AE545}" type="datetimeFigureOut">
               <a:rPr lang="pt-BR" smtClean="0"/>
-              <a:t>16/04/2019</a:t>
+              <a:t>22/04/2019</a:t>
             </a:fld>
             <a:endParaRPr lang="pt-BR"/>
           </a:p>
@@ -1779,7 +1783,7 @@
           <a:p>
             <a:fld id="{A74A3E01-8C82-1244-BAF0-CA56415AE545}" type="datetimeFigureOut">
               <a:rPr lang="pt-BR" smtClean="0"/>
-              <a:t>16/04/2019</a:t>
+              <a:t>22/04/2019</a:t>
             </a:fld>
             <a:endParaRPr lang="pt-BR"/>
           </a:p>
@@ -1874,7 +1878,7 @@
           <a:p>
             <a:fld id="{A74A3E01-8C82-1244-BAF0-CA56415AE545}" type="datetimeFigureOut">
               <a:rPr lang="pt-BR" smtClean="0"/>
-              <a:t>16/04/2019</a:t>
+              <a:t>22/04/2019</a:t>
             </a:fld>
             <a:endParaRPr lang="pt-BR"/>
           </a:p>
@@ -2231,7 +2235,7 @@
           <a:p>
             <a:fld id="{A74A3E01-8C82-1244-BAF0-CA56415AE545}" type="datetimeFigureOut">
               <a:rPr lang="pt-BR" smtClean="0"/>
-              <a:t>16/04/2019</a:t>
+              <a:t>22/04/2019</a:t>
             </a:fld>
             <a:endParaRPr lang="pt-BR"/>
           </a:p>
@@ -2549,7 +2553,7 @@
           <a:p>
             <a:fld id="{A74A3E01-8C82-1244-BAF0-CA56415AE545}" type="datetimeFigureOut">
               <a:rPr lang="pt-BR" smtClean="0"/>
-              <a:t>16/04/2019</a:t>
+              <a:t>22/04/2019</a:t>
             </a:fld>
             <a:endParaRPr lang="pt-BR"/>
           </a:p>
@@ -2793,7 +2797,7 @@
           <a:p>
             <a:fld id="{A74A3E01-8C82-1244-BAF0-CA56415AE545}" type="datetimeFigureOut">
               <a:rPr lang="pt-BR" smtClean="0"/>
-              <a:t>16/04/2019</a:t>
+              <a:t>22/04/2019</a:t>
             </a:fld>
             <a:endParaRPr lang="pt-BR"/>
           </a:p>
@@ -4805,6 +4809,89 @@
           </a:p>
           <a:p>
             <a:r>
+              <a:rPr lang="en-US" sz="3200" dirty="0"/>
+              <a:t>A </a:t>
+            </a:r>
+            <a:r>
+              <a:rPr lang="en-US" sz="3200" dirty="0" err="1"/>
+              <a:t>leveza</a:t>
+            </a:r>
+            <a:r>
+              <a:rPr lang="en-US" sz="3200" dirty="0"/>
+              <a:t> e </a:t>
+            </a:r>
+            <a:r>
+              <a:rPr lang="en-US" sz="3200" dirty="0" err="1"/>
+              <a:t>rapidez</a:t>
+            </a:r>
+            <a:r>
+              <a:rPr lang="en-US" sz="3200" dirty="0"/>
+              <a:t> </a:t>
+            </a:r>
+            <a:r>
+              <a:rPr lang="en-US" sz="3200" dirty="0" err="1"/>
+              <a:t>na</a:t>
+            </a:r>
+            <a:r>
+              <a:rPr lang="en-US" sz="3200" dirty="0"/>
+              <a:t> </a:t>
+            </a:r>
+            <a:r>
+              <a:rPr lang="en-US" sz="3200" dirty="0" err="1"/>
+              <a:t>troca</a:t>
+            </a:r>
+            <a:r>
+              <a:rPr lang="en-US" sz="3200" dirty="0"/>
+              <a:t> de </a:t>
+            </a:r>
+            <a:r>
+              <a:rPr lang="en-US" sz="3200" dirty="0" err="1"/>
+              <a:t>mensagens</a:t>
+            </a:r>
+            <a:r>
+              <a:rPr lang="en-US" sz="3200" dirty="0"/>
+              <a:t> </a:t>
+            </a:r>
+            <a:r>
+              <a:rPr lang="en-US" sz="3200" dirty="0" err="1"/>
+              <a:t>ameniza</a:t>
+            </a:r>
+            <a:r>
+              <a:rPr lang="en-US" sz="3200" dirty="0"/>
+              <a:t> </a:t>
+            </a:r>
+            <a:r>
+              <a:rPr lang="en-US" sz="3200" dirty="0" err="1"/>
+              <a:t>problemas</a:t>
+            </a:r>
+            <a:r>
+              <a:rPr lang="en-US" sz="3200" dirty="0"/>
+              <a:t> de </a:t>
+            </a:r>
+            <a:r>
+              <a:rPr lang="en-US" sz="3200" dirty="0" err="1"/>
+              <a:t>escalabilidade</a:t>
+            </a:r>
+            <a:r>
+              <a:rPr lang="en-US" sz="3200" dirty="0"/>
+              <a:t> </a:t>
+            </a:r>
+            <a:r>
+              <a:rPr lang="en-US" sz="3200" dirty="0" err="1"/>
+              <a:t>geográfica</a:t>
+            </a:r>
+            <a:r>
+              <a:rPr lang="en-US" sz="3200" dirty="0"/>
+              <a:t> e de </a:t>
+            </a:r>
+            <a:r>
+              <a:rPr lang="en-US" sz="3200" dirty="0" err="1"/>
+              <a:t>tamanho</a:t>
+            </a:r>
+            <a:endParaRPr lang="en-US" sz="3200" dirty="0"/>
+          </a:p>
+          <a:p>
+            <a:r>
               <a:rPr lang="en-US" sz="3200" dirty="0" err="1"/>
               <a:t>Diferente</a:t>
             </a:r>
@@ -4904,27 +4991,27 @@
           <a:p>
             <a:r>
               <a:rPr lang="en-US" sz="3200" dirty="0"/>
-              <a:t>A </a:t>
-            </a:r>
-            <a:r>
-              <a:rPr lang="en-US" sz="3200" dirty="0" err="1"/>
-              <a:t>leveza</a:t>
-            </a:r>
-            <a:r>
-              <a:rPr lang="en-US" sz="3200" dirty="0"/>
-              <a:t> e </a:t>
-            </a:r>
-            <a:r>
-              <a:rPr lang="en-US" sz="3200" dirty="0" err="1"/>
-              <a:t>rapidez</a:t>
+              <a:t>Este </a:t>
+            </a:r>
+            <a:r>
+              <a:rPr lang="en-US" sz="3200" dirty="0" err="1"/>
+              <a:t>é</a:t>
+            </a:r>
+            <a:r>
+              <a:rPr lang="en-US" sz="3200" dirty="0"/>
+              <a:t> um </a:t>
+            </a:r>
+            <a:r>
+              <a:rPr lang="en-US" sz="3200" dirty="0" err="1"/>
+              <a:t>protocolo</a:t>
             </a:r>
             <a:r>
               <a:rPr lang="en-US" sz="3200" dirty="0"/>
               <a:t> </a:t>
             </a:r>
             <a:r>
-              <a:rPr lang="en-US" sz="3200" dirty="0" err="1"/>
-              <a:t>na</a:t>
+              <a:rPr lang="en-US" sz="3200" i="1" dirty="0"/>
+              <a:t>firewall-friendly:</a:t>
             </a:r>
             <a:r>
               <a:rPr lang="en-US" sz="3200" dirty="0"/>
@@ -4932,57 +5019,13 @@
             </a:r>
             <a:r>
               <a:rPr lang="en-US" sz="3200" dirty="0" err="1"/>
-              <a:t>troca</a:t>
-            </a:r>
-            <a:r>
-              <a:rPr lang="en-US" sz="3200" dirty="0"/>
-              <a:t> de </a:t>
-            </a:r>
-            <a:r>
-              <a:rPr lang="en-US" sz="3200" dirty="0" err="1"/>
-              <a:t>mensagens</a:t>
-            </a:r>
-            <a:r>
-              <a:rPr lang="en-US" sz="3200" dirty="0"/>
-              <a:t> </a:t>
-            </a:r>
-            <a:r>
-              <a:rPr lang="en-US" sz="3200" dirty="0" err="1"/>
-              <a:t>ameniza</a:t>
-            </a:r>
-            <a:r>
-              <a:rPr lang="en-US" sz="3200" dirty="0"/>
-              <a:t> </a:t>
-            </a:r>
-            <a:r>
-              <a:rPr lang="en-US" sz="3200" dirty="0" err="1"/>
-              <a:t>problemas</a:t>
-            </a:r>
-            <a:r>
-              <a:rPr lang="en-US" sz="3200" dirty="0"/>
-              <a:t> de </a:t>
-            </a:r>
-            <a:r>
-              <a:rPr lang="en-US" sz="3200" dirty="0" err="1"/>
-              <a:t>escalabilidade</a:t>
-            </a:r>
-            <a:r>
-              <a:rPr lang="en-US" sz="3200" dirty="0"/>
-              <a:t> </a:t>
-            </a:r>
-            <a:r>
-              <a:rPr lang="en-US" sz="3200" dirty="0" err="1"/>
-              <a:t>geográfica</a:t>
-            </a:r>
-            <a:r>
-              <a:rPr lang="en-US" sz="3200" dirty="0"/>
-              <a:t> e de </a:t>
-            </a:r>
-            <a:r>
-              <a:rPr lang="en-US" sz="3200" dirty="0" err="1"/>
-              <a:t>tamanho</a:t>
-            </a:r>
-            <a:endParaRPr lang="en-US" sz="3200" dirty="0"/>
+              <a:t>amigáveis</a:t>
+            </a:r>
+            <a:r>
+              <a:rPr lang="en-US" sz="3200" dirty="0"/>
+              <a:t> com firewalls</a:t>
+            </a:r>
+            <a:endParaRPr lang="en-US" sz="3200" i="1" dirty="0"/>
           </a:p>
         </p:txBody>
       </p:sp>
@@ -5155,7 +5198,7 @@
                             </p:stCondLst>
                             <p:childTnLst>
                               <p:par>
-                                <p:cTn id="10" presetID="9" presetClass="exit" presetSubtype="0" fill="hold" nodeType="clickEffect">
+                                <p:cTn id="10" presetID="9" presetClass="exit" presetSubtype="0" fill="hold" grpId="1" nodeType="clickEffect">
                                   <p:stCondLst>
                                     <p:cond delay="0"/>
                                   </p:stCondLst>
@@ -5259,7 +5302,7 @@
                             </p:stCondLst>
                             <p:childTnLst>
                               <p:par>
-                                <p:cTn id="18" presetID="9" presetClass="exit" presetSubtype="0" fill="hold" nodeType="clickEffect">
+                                <p:cTn id="18" presetID="9" presetClass="exit" presetSubtype="0" fill="hold" grpId="1" nodeType="clickEffect">
                                   <p:stCondLst>
                                     <p:cond delay="0"/>
                                   </p:stCondLst>
@@ -5336,6 +5379,110 @@
                                           <p:spTgt spid="3">
                                             <p:txEl>
                                               <p:pRg st="2" end="2"/>
+                                            </p:txEl>
+                                          </p:spTgt>
+                                        </p:tgtEl>
+                                      </p:cBhvr>
+                                    </p:animEffect>
+                                  </p:childTnLst>
+                                </p:cTn>
+                              </p:par>
+                            </p:childTnLst>
+                          </p:cTn>
+                        </p:par>
+                      </p:childTnLst>
+                    </p:cTn>
+                  </p:par>
+                  <p:par>
+                    <p:cTn id="24" fill="hold">
+                      <p:stCondLst>
+                        <p:cond delay="indefinite"/>
+                      </p:stCondLst>
+                      <p:childTnLst>
+                        <p:par>
+                          <p:cTn id="25" fill="hold">
+                            <p:stCondLst>
+                              <p:cond delay="0"/>
+                            </p:stCondLst>
+                            <p:childTnLst>
+                              <p:par>
+                                <p:cTn id="26" presetID="9" presetClass="exit" presetSubtype="0" fill="hold" grpId="1" nodeType="clickEffect">
+                                  <p:stCondLst>
+                                    <p:cond delay="0"/>
+                                  </p:stCondLst>
+                                  <p:childTnLst>
+                                    <p:animEffect transition="out" filter="dissolve">
+                                      <p:cBhvr>
+                                        <p:cTn id="27" dur="500"/>
+                                        <p:tgtEl>
+                                          <p:spTgt spid="3">
+                                            <p:txEl>
+                                              <p:pRg st="2" end="2"/>
+                                            </p:txEl>
+                                          </p:spTgt>
+                                        </p:tgtEl>
+                                      </p:cBhvr>
+                                    </p:animEffect>
+                                    <p:set>
+                                      <p:cBhvr>
+                                        <p:cTn id="28" dur="1" fill="hold">
+                                          <p:stCondLst>
+                                            <p:cond delay="499"/>
+                                          </p:stCondLst>
+                                        </p:cTn>
+                                        <p:tgtEl>
+                                          <p:spTgt spid="3">
+                                            <p:txEl>
+                                              <p:pRg st="2" end="2"/>
+                                            </p:txEl>
+                                          </p:spTgt>
+                                        </p:tgtEl>
+                                        <p:attrNameLst>
+                                          <p:attrName>style.visibility</p:attrName>
+                                        </p:attrNameLst>
+                                      </p:cBhvr>
+                                      <p:to>
+                                        <p:strVal val="hidden"/>
+                                      </p:to>
+                                    </p:set>
+                                  </p:childTnLst>
+                                </p:cTn>
+                              </p:par>
+                              <p:par>
+                                <p:cTn id="29" presetID="9" presetClass="entr" presetSubtype="0" fill="hold" grpId="0" nodeType="withEffect">
+                                  <p:stCondLst>
+                                    <p:cond delay="0"/>
+                                  </p:stCondLst>
+                                  <p:childTnLst>
+                                    <p:set>
+                                      <p:cBhvr>
+                                        <p:cTn id="30" dur="1" fill="hold">
+                                          <p:stCondLst>
+                                            <p:cond delay="0"/>
+                                          </p:stCondLst>
+                                        </p:cTn>
+                                        <p:tgtEl>
+                                          <p:spTgt spid="3">
+                                            <p:txEl>
+                                              <p:pRg st="3" end="3"/>
+                                            </p:txEl>
+                                          </p:spTgt>
+                                        </p:tgtEl>
+                                        <p:attrNameLst>
+                                          <p:attrName>style.visibility</p:attrName>
+                                        </p:attrNameLst>
+                                      </p:cBhvr>
+                                      <p:to>
+                                        <p:strVal val="visible"/>
+                                      </p:to>
+                                    </p:set>
+                                    <p:animEffect transition="in" filter="dissolve">
+                                      <p:cBhvr>
+                                        <p:cTn id="31" dur="500"/>
+                                        <p:tgtEl>
+                                          <p:spTgt spid="3">
+                                            <p:txEl>
+                                              <p:pRg st="3" end="3"/>
                                             </p:txEl>
                                           </p:spTgt>
                                         </p:tgtEl>
@@ -5373,12 +5520,2444 @@
     </p:tnLst>
     <p:bldLst>
       <p:bldP spid="3" grpId="0" uiExpand="1" build="p"/>
+      <p:bldP spid="3" grpId="1" uiExpand="1" build="p"/>
     </p:bldLst>
   </p:timing>
 </p:sld>
 </file>
 
 <file path=ppt/slides/slide5.xml><?xml version="1.0" encoding="utf-8"?>
+<p:sld xmlns:a="http://schemas.openxmlformats.org/drawingml/2006/main" xmlns:r="http://schemas.openxmlformats.org/officeDocument/2006/relationships" xmlns:p="http://schemas.openxmlformats.org/presentationml/2006/main">
+  <p:cSld>
+    <p:spTree>
+      <p:nvGrpSpPr>
+        <p:cNvPr id="1" name=""/>
+        <p:cNvGrpSpPr/>
+        <p:nvPr/>
+      </p:nvGrpSpPr>
+      <p:grpSpPr>
+        <a:xfrm>
+          <a:off x="0" y="0"/>
+          <a:ext cx="0" cy="0"/>
+          <a:chOff x="0" y="0"/>
+          <a:chExt cx="0" cy="0"/>
+        </a:xfrm>
+      </p:grpSpPr>
+      <p:pic>
+        <p:nvPicPr>
+          <p:cNvPr id="6" name="Picture 5" descr="A close up of a girl&#10;&#10;Description automatically generated">
+            <a:extLst>
+              <a:ext uri="{FF2B5EF4-FFF2-40B4-BE49-F238E27FC236}">
+                <a16:creationId xmlns:a16="http://schemas.microsoft.com/office/drawing/2014/main" id="{2C06C90C-9DD1-6847-BAEB-2164FDD0A6B7}"/>
+              </a:ext>
+            </a:extLst>
+          </p:cNvPr>
+          <p:cNvPicPr>
+            <a:picLocks noChangeAspect="1"/>
+          </p:cNvPicPr>
+          <p:nvPr/>
+        </p:nvPicPr>
+        <p:blipFill>
+          <a:blip r:embed="rId2"/>
+          <a:stretch>
+            <a:fillRect/>
+          </a:stretch>
+        </p:blipFill>
+        <p:spPr>
+          <a:xfrm>
+            <a:off x="433693" y="-122830"/>
+            <a:ext cx="11324613" cy="7533330"/>
+          </a:xfrm>
+          <a:prstGeom prst="rect">
+            <a:avLst/>
+          </a:prstGeom>
+        </p:spPr>
+      </p:pic>
+      <p:sp>
+        <p:nvSpPr>
+          <p:cNvPr id="7" name="Rectangle 6">
+            <a:extLst>
+              <a:ext uri="{FF2B5EF4-FFF2-40B4-BE49-F238E27FC236}">
+                <a16:creationId xmlns:a16="http://schemas.microsoft.com/office/drawing/2014/main" id="{DE16EB4E-6E06-674B-9E60-57FE0533F1CB}"/>
+              </a:ext>
+            </a:extLst>
+          </p:cNvPr>
+          <p:cNvSpPr/>
+          <p:nvPr/>
+        </p:nvSpPr>
+        <p:spPr>
+          <a:xfrm>
+            <a:off x="5787462" y="491315"/>
+            <a:ext cx="3842657" cy="2677656"/>
+          </a:xfrm>
+          <a:prstGeom prst="rect">
+            <a:avLst/>
+          </a:prstGeom>
+        </p:spPr>
+        <p:txBody>
+          <a:bodyPr wrap="square">
+            <a:spAutoFit/>
+          </a:bodyPr>
+          <a:lstStyle/>
+          <a:p>
+            <a:r>
+              <a:rPr lang="en-US" sz="2400" b="1" dirty="0"/>
+              <a:t>Mas se </a:t>
+            </a:r>
+            <a:r>
+              <a:rPr lang="en-US" sz="2400" b="1" dirty="0" err="1"/>
+              <a:t>eu</a:t>
+            </a:r>
+            <a:r>
+              <a:rPr lang="en-US" sz="2400" b="1" dirty="0"/>
+              <a:t> </a:t>
+            </a:r>
+            <a:r>
+              <a:rPr lang="en-US" sz="2400" b="1" dirty="0" err="1"/>
+              <a:t>criar</a:t>
+            </a:r>
+            <a:r>
+              <a:rPr lang="en-US" sz="2400" b="1" dirty="0"/>
+              <a:t> um </a:t>
+            </a:r>
+            <a:r>
+              <a:rPr lang="en-US" sz="2400" b="1" dirty="0" err="1"/>
+              <a:t>servidor</a:t>
+            </a:r>
+            <a:r>
+              <a:rPr lang="en-US" sz="2400" b="1" dirty="0"/>
+              <a:t> de socket TCP </a:t>
+            </a:r>
+            <a:r>
+              <a:rPr lang="en-US" sz="2400" b="1" dirty="0" err="1"/>
+              <a:t>ou</a:t>
+            </a:r>
+            <a:r>
+              <a:rPr lang="en-US" sz="2400" b="1" dirty="0"/>
+              <a:t> UDP, </a:t>
+            </a:r>
+            <a:r>
+              <a:rPr lang="en-US" sz="2400" b="1" dirty="0" err="1"/>
+              <a:t>em</a:t>
+            </a:r>
+            <a:r>
+              <a:rPr lang="en-US" sz="2400" b="1" dirty="0"/>
+              <a:t> Java </a:t>
+            </a:r>
+            <a:r>
+              <a:rPr lang="en-US" sz="2400" b="1" dirty="0" err="1"/>
+              <a:t>por</a:t>
+            </a:r>
+            <a:r>
+              <a:rPr lang="en-US" sz="2400" b="1" dirty="0"/>
+              <a:t> </a:t>
+            </a:r>
+            <a:r>
+              <a:rPr lang="en-US" sz="2400" b="1" dirty="0" err="1"/>
+              <a:t>exemplo</a:t>
+            </a:r>
+            <a:r>
+              <a:rPr lang="en-US" sz="2400" b="1" dirty="0"/>
+              <a:t>, e </a:t>
+            </a:r>
+            <a:r>
+              <a:rPr lang="en-US" sz="2400" b="1" dirty="0" err="1"/>
+              <a:t>colocar</a:t>
+            </a:r>
+            <a:r>
+              <a:rPr lang="en-US" sz="2400" b="1" dirty="0"/>
+              <a:t> </a:t>
+            </a:r>
+            <a:r>
+              <a:rPr lang="en-US" sz="2400" b="1" dirty="0" err="1"/>
+              <a:t>pra</a:t>
+            </a:r>
+            <a:r>
+              <a:rPr lang="en-US" sz="2400" b="1" dirty="0"/>
+              <a:t> </a:t>
+            </a:r>
+            <a:r>
+              <a:rPr lang="en-US" sz="2400" b="1" dirty="0" err="1"/>
+              <a:t>escutar</a:t>
+            </a:r>
+            <a:r>
+              <a:rPr lang="en-US" sz="2400" b="1" dirty="0"/>
+              <a:t> </a:t>
+            </a:r>
+            <a:r>
+              <a:rPr lang="en-US" sz="2400" b="1" dirty="0" err="1"/>
+              <a:t>na</a:t>
+            </a:r>
+            <a:r>
+              <a:rPr lang="en-US" sz="2400" b="1" dirty="0"/>
+              <a:t> porta 80 </a:t>
+            </a:r>
+            <a:r>
+              <a:rPr lang="en-US" sz="2400" b="1" dirty="0" err="1"/>
+              <a:t>ele</a:t>
+            </a:r>
+            <a:r>
+              <a:rPr lang="en-US" sz="2400" b="1" dirty="0"/>
+              <a:t> </a:t>
+            </a:r>
+            <a:r>
+              <a:rPr lang="en-US" sz="2400" b="1" dirty="0" err="1"/>
+              <a:t>também</a:t>
+            </a:r>
+            <a:r>
+              <a:rPr lang="en-US" sz="2400" b="1" dirty="0"/>
+              <a:t> </a:t>
+            </a:r>
+            <a:r>
+              <a:rPr lang="en-US" sz="2400" b="1" dirty="0" err="1"/>
+              <a:t>vai</a:t>
+            </a:r>
+            <a:r>
+              <a:rPr lang="en-US" sz="2400" b="1" dirty="0"/>
+              <a:t> </a:t>
+            </a:r>
+            <a:r>
+              <a:rPr lang="en-US" sz="2400" b="1" dirty="0" err="1"/>
+              <a:t>sempre</a:t>
+            </a:r>
+            <a:r>
+              <a:rPr lang="en-US" sz="2400" b="1" dirty="0"/>
+              <a:t> </a:t>
+            </a:r>
+            <a:r>
+              <a:rPr lang="en-US" sz="2400" b="1" dirty="0" err="1"/>
+              <a:t>funcionar</a:t>
+            </a:r>
+            <a:r>
+              <a:rPr lang="en-US" sz="2400" b="1" dirty="0"/>
+              <a:t>, </a:t>
+            </a:r>
+            <a:r>
+              <a:rPr lang="en-US" sz="2400" b="1" dirty="0" err="1"/>
+              <a:t>certo</a:t>
+            </a:r>
+            <a:r>
+              <a:rPr lang="en-US" sz="2400" b="1" dirty="0"/>
+              <a:t>?</a:t>
+            </a:r>
+          </a:p>
+        </p:txBody>
+      </p:sp>
+    </p:spTree>
+    <p:extLst>
+      <p:ext uri="{BB962C8B-B14F-4D97-AF65-F5344CB8AC3E}">
+        <p14:creationId xmlns:p14="http://schemas.microsoft.com/office/powerpoint/2010/main" val="321814004"/>
+      </p:ext>
+    </p:extLst>
+  </p:cSld>
+  <p:clrMapOvr>
+    <a:masterClrMapping/>
+  </p:clrMapOvr>
+  <p:timing>
+    <p:tnLst>
+      <p:par>
+        <p:cTn id="1" dur="indefinite" restart="never" nodeType="tmRoot">
+          <p:childTnLst>
+            <p:seq concurrent="1" nextAc="seek">
+              <p:cTn id="2" dur="indefinite" nodeType="mainSeq">
+                <p:childTnLst>
+                  <p:par>
+                    <p:cTn id="3" fill="hold">
+                      <p:stCondLst>
+                        <p:cond delay="indefinite"/>
+                        <p:cond evt="onBegin" delay="0">
+                          <p:tn val="2"/>
+                        </p:cond>
+                      </p:stCondLst>
+                      <p:childTnLst>
+                        <p:par>
+                          <p:cTn id="4" fill="hold">
+                            <p:stCondLst>
+                              <p:cond delay="0"/>
+                            </p:stCondLst>
+                            <p:childTnLst>
+                              <p:par>
+                                <p:cTn id="5" presetID="9" presetClass="entr" presetSubtype="0" fill="hold" grpId="1" nodeType="afterEffect">
+                                  <p:stCondLst>
+                                    <p:cond delay="0"/>
+                                  </p:stCondLst>
+                                  <p:childTnLst>
+                                    <p:set>
+                                      <p:cBhvr>
+                                        <p:cTn id="6" dur="1" fill="hold">
+                                          <p:stCondLst>
+                                            <p:cond delay="0"/>
+                                          </p:stCondLst>
+                                        </p:cTn>
+                                        <p:tgtEl>
+                                          <p:spTgt spid="7"/>
+                                        </p:tgtEl>
+                                        <p:attrNameLst>
+                                          <p:attrName>style.visibility</p:attrName>
+                                        </p:attrNameLst>
+                                      </p:cBhvr>
+                                      <p:to>
+                                        <p:strVal val="visible"/>
+                                      </p:to>
+                                    </p:set>
+                                    <p:animEffect transition="in" filter="dissolve">
+                                      <p:cBhvr>
+                                        <p:cTn id="7" dur="500"/>
+                                        <p:tgtEl>
+                                          <p:spTgt spid="7"/>
+                                        </p:tgtEl>
+                                      </p:cBhvr>
+                                    </p:animEffect>
+                                  </p:childTnLst>
+                                </p:cTn>
+                              </p:par>
+                            </p:childTnLst>
+                          </p:cTn>
+                        </p:par>
+                      </p:childTnLst>
+                    </p:cTn>
+                  </p:par>
+                </p:childTnLst>
+              </p:cTn>
+              <p:prevCondLst>
+                <p:cond evt="onPrev" delay="0">
+                  <p:tgtEl>
+                    <p:sldTgt/>
+                  </p:tgtEl>
+                </p:cond>
+              </p:prevCondLst>
+              <p:nextCondLst>
+                <p:cond evt="onNext" delay="0">
+                  <p:tgtEl>
+                    <p:sldTgt/>
+                  </p:tgtEl>
+                </p:cond>
+              </p:nextCondLst>
+            </p:seq>
+          </p:childTnLst>
+        </p:cTn>
+      </p:par>
+    </p:tnLst>
+    <p:bldLst>
+      <p:bldP spid="7" grpId="1"/>
+    </p:bldLst>
+  </p:timing>
+</p:sld>
+</file>
+
+<file path=ppt/slides/slide6.xml><?xml version="1.0" encoding="utf-8"?>
+<p:sld xmlns:a="http://schemas.openxmlformats.org/drawingml/2006/main" xmlns:r="http://schemas.openxmlformats.org/officeDocument/2006/relationships" xmlns:p="http://schemas.openxmlformats.org/presentationml/2006/main">
+  <p:cSld>
+    <p:spTree>
+      <p:nvGrpSpPr>
+        <p:cNvPr id="1" name=""/>
+        <p:cNvGrpSpPr/>
+        <p:nvPr/>
+      </p:nvGrpSpPr>
+      <p:grpSpPr>
+        <a:xfrm>
+          <a:off x="0" y="0"/>
+          <a:ext cx="0" cy="0"/>
+          <a:chOff x="0" y="0"/>
+          <a:chExt cx="0" cy="0"/>
+        </a:xfrm>
+      </p:grpSpPr>
+      <p:sp>
+        <p:nvSpPr>
+          <p:cNvPr id="3" name="Content Placeholder 2">
+            <a:extLst>
+              <a:ext uri="{FF2B5EF4-FFF2-40B4-BE49-F238E27FC236}">
+                <a16:creationId xmlns:a16="http://schemas.microsoft.com/office/drawing/2014/main" id="{56B7BAEB-9907-DC45-A478-033AB322DAD1}"/>
+              </a:ext>
+            </a:extLst>
+          </p:cNvPr>
+          <p:cNvSpPr>
+            <a:spLocks noGrp="1"/>
+          </p:cNvSpPr>
+          <p:nvPr>
+            <p:ph idx="1"/>
+          </p:nvPr>
+        </p:nvSpPr>
+        <p:spPr>
+          <a:xfrm>
+            <a:off x="693683" y="1403135"/>
+            <a:ext cx="11067393" cy="5202621"/>
+          </a:xfrm>
+        </p:spPr>
+        <p:txBody>
+          <a:bodyPr>
+            <a:noAutofit/>
+          </a:bodyPr>
+          <a:lstStyle/>
+          <a:p>
+            <a:r>
+              <a:rPr lang="en-US" sz="3200" dirty="0" err="1"/>
+              <a:t>Pode</a:t>
+            </a:r>
+            <a:r>
+              <a:rPr lang="en-US" sz="3200" dirty="0"/>
+              <a:t> </a:t>
+            </a:r>
+            <a:r>
+              <a:rPr lang="en-US" sz="3200" dirty="0" err="1"/>
+              <a:t>funcionar</a:t>
+            </a:r>
+            <a:r>
+              <a:rPr lang="en-US" sz="3200" dirty="0"/>
+              <a:t>… se </a:t>
+            </a:r>
+            <a:r>
+              <a:rPr lang="en-US" sz="3200" dirty="0" err="1"/>
+              <a:t>não</a:t>
+            </a:r>
+            <a:r>
+              <a:rPr lang="en-US" sz="3200" dirty="0"/>
+              <a:t> </a:t>
+            </a:r>
+            <a:r>
+              <a:rPr lang="en-US" sz="3200" dirty="0" err="1"/>
+              <a:t>tiver</a:t>
+            </a:r>
+            <a:r>
+              <a:rPr lang="en-US" sz="3200" dirty="0"/>
+              <a:t> </a:t>
+            </a:r>
+            <a:r>
+              <a:rPr lang="en-US" sz="3200" dirty="0" err="1"/>
+              <a:t>nenhuma</a:t>
+            </a:r>
+            <a:r>
+              <a:rPr lang="en-US" sz="3200" dirty="0"/>
+              <a:t> ferramenta de </a:t>
+            </a:r>
+            <a:r>
+              <a:rPr lang="en-US" sz="3200" dirty="0">
+                <a:hlinkClick r:id="rId2"/>
+              </a:rPr>
+              <a:t>Deep Packet Inspection (DPI)</a:t>
+            </a:r>
+            <a:r>
+              <a:rPr lang="en-US" sz="3200" dirty="0"/>
+              <a:t> </a:t>
+            </a:r>
+            <a:r>
+              <a:rPr lang="en-US" sz="3200" dirty="0" err="1"/>
+              <a:t>na</a:t>
+            </a:r>
+            <a:r>
+              <a:rPr lang="en-US" sz="3200" dirty="0"/>
+              <a:t> </a:t>
+            </a:r>
+            <a:r>
+              <a:rPr lang="en-US" sz="3200" dirty="0" err="1"/>
+              <a:t>rede</a:t>
+            </a:r>
+            <a:endParaRPr lang="en-US" sz="3200" dirty="0"/>
+          </a:p>
+          <a:p>
+            <a:r>
+              <a:rPr lang="en-US" sz="3200" dirty="0" err="1"/>
+              <a:t>Tais</a:t>
+            </a:r>
+            <a:r>
+              <a:rPr lang="en-US" sz="3200" dirty="0"/>
+              <a:t> ferramentas </a:t>
+            </a:r>
+            <a:r>
+              <a:rPr lang="en-US" sz="3200" dirty="0" err="1"/>
+              <a:t>fazem</a:t>
+            </a:r>
+            <a:r>
+              <a:rPr lang="en-US" sz="3200" dirty="0"/>
+              <a:t> </a:t>
+            </a:r>
+            <a:r>
+              <a:rPr lang="en-US" sz="3200" dirty="0" err="1"/>
+              <a:t>Inspeção</a:t>
+            </a:r>
+            <a:r>
+              <a:rPr lang="en-US" sz="3200" dirty="0"/>
+              <a:t> </a:t>
+            </a:r>
+            <a:r>
+              <a:rPr lang="en-US" sz="3200" dirty="0" err="1"/>
+              <a:t>Profunda</a:t>
+            </a:r>
+            <a:r>
+              <a:rPr lang="en-US" sz="3200" dirty="0"/>
+              <a:t> de </a:t>
+            </a:r>
+            <a:r>
+              <a:rPr lang="en-US" sz="3200" dirty="0" err="1"/>
+              <a:t>Pacotes</a:t>
+            </a:r>
+            <a:r>
+              <a:rPr lang="en-US" sz="3200" dirty="0"/>
+              <a:t> e </a:t>
+            </a:r>
+            <a:r>
+              <a:rPr lang="en-US" sz="3200" dirty="0" err="1"/>
+              <a:t>podem</a:t>
+            </a:r>
+            <a:r>
+              <a:rPr lang="en-US" sz="3200" dirty="0"/>
+              <a:t> </a:t>
+            </a:r>
+            <a:r>
+              <a:rPr lang="en-US" sz="3200" dirty="0" err="1"/>
+              <a:t>bloquear</a:t>
+            </a:r>
+            <a:r>
+              <a:rPr lang="en-US" sz="3200" dirty="0"/>
+              <a:t> </a:t>
+            </a:r>
+            <a:r>
+              <a:rPr lang="en-US" sz="3200" dirty="0" err="1"/>
+              <a:t>pacotes</a:t>
+            </a:r>
+            <a:r>
+              <a:rPr lang="en-US" sz="3200" dirty="0"/>
+              <a:t> </a:t>
+            </a:r>
+            <a:r>
+              <a:rPr lang="en-US" sz="3200" dirty="0" err="1"/>
+              <a:t>indesejados</a:t>
+            </a:r>
+            <a:endParaRPr lang="en-US" sz="3200" dirty="0"/>
+          </a:p>
+          <a:p>
+            <a:r>
+              <a:rPr lang="en-US" sz="3200" i="1" dirty="0"/>
+              <a:t>No </a:t>
+            </a:r>
+            <a:r>
+              <a:rPr lang="en-US" sz="3200" i="1" dirty="0" err="1"/>
+              <a:t>lugar</a:t>
+            </a:r>
+            <a:r>
+              <a:rPr lang="en-US" sz="3200" i="1" dirty="0"/>
+              <a:t> de </a:t>
+            </a:r>
+            <a:r>
+              <a:rPr lang="en-US" sz="3200" i="1" dirty="0" err="1"/>
+              <a:t>apenas</a:t>
+            </a:r>
+            <a:r>
+              <a:rPr lang="en-US" sz="3200" i="1" dirty="0"/>
+              <a:t> </a:t>
+            </a:r>
+            <a:r>
+              <a:rPr lang="en-US" sz="3200" i="1" dirty="0" err="1"/>
+              <a:t>liberar</a:t>
+            </a:r>
+            <a:r>
+              <a:rPr lang="en-US" sz="3200" i="1" dirty="0"/>
+              <a:t> </a:t>
+            </a:r>
+            <a:r>
+              <a:rPr lang="en-US" sz="3200" i="1" dirty="0" err="1"/>
+              <a:t>ou</a:t>
+            </a:r>
+            <a:r>
+              <a:rPr lang="en-US" sz="3200" i="1" dirty="0"/>
+              <a:t> </a:t>
+            </a:r>
+            <a:r>
+              <a:rPr lang="en-US" sz="3200" i="1" dirty="0" err="1"/>
+              <a:t>bloquear</a:t>
+            </a:r>
+            <a:r>
+              <a:rPr lang="en-US" sz="3200" i="1" dirty="0"/>
+              <a:t> </a:t>
+            </a:r>
+            <a:r>
+              <a:rPr lang="en-US" sz="3200" i="1" dirty="0" err="1"/>
+              <a:t>portas</a:t>
+            </a:r>
+            <a:r>
+              <a:rPr lang="en-US" sz="3200" i="1" dirty="0"/>
+              <a:t> </a:t>
+            </a:r>
+            <a:r>
+              <a:rPr lang="en-US" sz="3200" i="1" dirty="0" err="1"/>
+              <a:t>como</a:t>
+            </a:r>
+            <a:r>
+              <a:rPr lang="en-US" sz="3200" i="1" dirty="0"/>
+              <a:t> </a:t>
+            </a:r>
+            <a:r>
+              <a:rPr lang="en-US" sz="3200" i="1" dirty="0" err="1"/>
+              <a:t>fazem</a:t>
+            </a:r>
+            <a:r>
+              <a:rPr lang="en-US" sz="3200" i="1" dirty="0"/>
+              <a:t> </a:t>
+            </a:r>
+            <a:r>
+              <a:rPr lang="en-US" sz="3200" i="1" dirty="0" err="1"/>
+              <a:t>os</a:t>
+            </a:r>
+            <a:r>
+              <a:rPr lang="en-US" sz="3200" i="1" dirty="0"/>
+              <a:t> firewalls, </a:t>
+            </a:r>
+            <a:r>
+              <a:rPr lang="en-US" sz="3200" i="1" dirty="0" err="1"/>
+              <a:t>elas</a:t>
+            </a:r>
+            <a:r>
+              <a:rPr lang="en-US" sz="3200" i="1" dirty="0"/>
+              <a:t> </a:t>
+            </a:r>
+            <a:r>
+              <a:rPr lang="en-US" sz="3200" i="1" dirty="0" err="1"/>
+              <a:t>analisam</a:t>
+            </a:r>
+            <a:r>
+              <a:rPr lang="en-US" sz="3200" i="1" dirty="0"/>
+              <a:t> o </a:t>
+            </a:r>
+            <a:r>
+              <a:rPr lang="en-US" sz="3200" i="1" dirty="0" err="1"/>
+              <a:t>cabeçalho</a:t>
+            </a:r>
+            <a:r>
+              <a:rPr lang="en-US" sz="3200" i="1" dirty="0"/>
+              <a:t> dos </a:t>
+            </a:r>
+            <a:r>
+              <a:rPr lang="en-US" sz="3200" i="1" dirty="0" err="1"/>
+              <a:t>pacotes</a:t>
+            </a:r>
+            <a:r>
+              <a:rPr lang="en-US" sz="3200" i="1" dirty="0"/>
+              <a:t> para saber se o que </a:t>
+            </a:r>
+            <a:r>
+              <a:rPr lang="en-US" sz="3200" i="1" dirty="0" err="1"/>
+              <a:t>está</a:t>
+            </a:r>
+            <a:r>
+              <a:rPr lang="en-US" sz="3200" i="1" dirty="0"/>
+              <a:t> </a:t>
+            </a:r>
+            <a:r>
+              <a:rPr lang="en-US" sz="3200" i="1" dirty="0" err="1"/>
+              <a:t>sendo</a:t>
+            </a:r>
+            <a:r>
+              <a:rPr lang="en-US" sz="3200" i="1" dirty="0"/>
+              <a:t> </a:t>
+            </a:r>
+            <a:r>
+              <a:rPr lang="en-US" sz="3200" i="1" dirty="0" err="1"/>
+              <a:t>trafegado</a:t>
+            </a:r>
+            <a:r>
+              <a:rPr lang="en-US" sz="3200" i="1" dirty="0"/>
+              <a:t> </a:t>
+            </a:r>
+            <a:r>
+              <a:rPr lang="en-US" sz="3200" i="1" dirty="0" err="1"/>
+              <a:t>é</a:t>
+            </a:r>
+            <a:r>
+              <a:rPr lang="en-US" sz="3200" i="1" dirty="0"/>
+              <a:t> </a:t>
+            </a:r>
+            <a:r>
+              <a:rPr lang="en-US" sz="3200" i="1" dirty="0" err="1"/>
+              <a:t>realmente</a:t>
+            </a:r>
+            <a:r>
+              <a:rPr lang="en-US" sz="3200" i="1" dirty="0"/>
+              <a:t> o </a:t>
+            </a:r>
+            <a:r>
+              <a:rPr lang="en-US" sz="3200" i="1" dirty="0" err="1"/>
+              <a:t>esperado</a:t>
+            </a:r>
+            <a:r>
+              <a:rPr lang="en-US" sz="3200" i="1" dirty="0"/>
+              <a:t> para </a:t>
+            </a:r>
+            <a:r>
+              <a:rPr lang="en-US" sz="3200" i="1" dirty="0" err="1"/>
+              <a:t>uma</a:t>
+            </a:r>
+            <a:r>
+              <a:rPr lang="en-US" sz="3200" i="1" dirty="0"/>
+              <a:t> </a:t>
+            </a:r>
+            <a:r>
+              <a:rPr lang="en-US" sz="3200" i="1" dirty="0" err="1"/>
+              <a:t>determinada</a:t>
+            </a:r>
+            <a:r>
+              <a:rPr lang="en-US" sz="3200" i="1" dirty="0"/>
+              <a:t> porta de </a:t>
+            </a:r>
+            <a:r>
+              <a:rPr lang="en-US" sz="3200" i="1" dirty="0" err="1"/>
+              <a:t>comunicação</a:t>
+            </a:r>
+            <a:endParaRPr lang="en-US" sz="3200" i="1" dirty="0"/>
+          </a:p>
+        </p:txBody>
+      </p:sp>
+      <p:sp>
+        <p:nvSpPr>
+          <p:cNvPr id="4" name="Rectangle 3">
+            <a:extLst>
+              <a:ext uri="{FF2B5EF4-FFF2-40B4-BE49-F238E27FC236}">
+                <a16:creationId xmlns:a16="http://schemas.microsoft.com/office/drawing/2014/main" id="{AA712CCC-0F51-5147-857A-F33544398307}"/>
+              </a:ext>
+            </a:extLst>
+          </p:cNvPr>
+          <p:cNvSpPr/>
+          <p:nvPr/>
+        </p:nvSpPr>
+        <p:spPr>
+          <a:xfrm>
+            <a:off x="0" y="113777"/>
+            <a:ext cx="12123683" cy="1015663"/>
+          </a:xfrm>
+          <a:prstGeom prst="rect">
+            <a:avLst/>
+          </a:prstGeom>
+          <a:noFill/>
+        </p:spPr>
+        <p:txBody>
+          <a:bodyPr wrap="square" lIns="91440" tIns="45720" rIns="91440" bIns="45720">
+            <a:spAutoFit/>
+          </a:bodyPr>
+          <a:lstStyle/>
+          <a:p>
+            <a:pPr algn="ctr"/>
+            <a:r>
+              <a:rPr lang="en-US" sz="6000" b="1" cap="none" spc="0" dirty="0" err="1">
+                <a:ln w="0"/>
+                <a:solidFill>
+                  <a:schemeClr val="tx1"/>
+                </a:solidFill>
+                <a:effectLst>
+                  <a:outerShdw blurRad="38100" dist="19050" dir="2700000" algn="tl" rotWithShape="0">
+                    <a:schemeClr val="dk1">
+                      <a:alpha val="40000"/>
+                    </a:schemeClr>
+                  </a:outerShdw>
+                </a:effectLst>
+              </a:rPr>
+              <a:t>Errado</a:t>
+            </a:r>
+            <a:r>
+              <a:rPr lang="en-US" sz="6000" b="1" cap="none" spc="0" dirty="0">
+                <a:ln w="0"/>
+                <a:solidFill>
+                  <a:schemeClr val="tx1"/>
+                </a:solidFill>
+                <a:effectLst>
+                  <a:outerShdw blurRad="38100" dist="19050" dir="2700000" algn="tl" rotWithShape="0">
+                    <a:schemeClr val="dk1">
+                      <a:alpha val="40000"/>
+                    </a:schemeClr>
+                  </a:outerShdw>
+                </a:effectLst>
+              </a:rPr>
+              <a:t>!</a:t>
+            </a:r>
+          </a:p>
+        </p:txBody>
+      </p:sp>
+    </p:spTree>
+    <p:extLst>
+      <p:ext uri="{BB962C8B-B14F-4D97-AF65-F5344CB8AC3E}">
+        <p14:creationId xmlns:p14="http://schemas.microsoft.com/office/powerpoint/2010/main" val="1213832657"/>
+      </p:ext>
+    </p:extLst>
+  </p:cSld>
+  <p:clrMapOvr>
+    <a:masterClrMapping/>
+  </p:clrMapOvr>
+  <p:timing>
+    <p:tnLst>
+      <p:par>
+        <p:cTn id="1" dur="indefinite" restart="never" nodeType="tmRoot">
+          <p:childTnLst>
+            <p:seq concurrent="1" nextAc="seek">
+              <p:cTn id="2" dur="indefinite" nodeType="mainSeq">
+                <p:childTnLst>
+                  <p:par>
+                    <p:cTn id="3" fill="hold">
+                      <p:stCondLst>
+                        <p:cond delay="indefinite"/>
+                      </p:stCondLst>
+                      <p:childTnLst>
+                        <p:par>
+                          <p:cTn id="4" fill="hold">
+                            <p:stCondLst>
+                              <p:cond delay="0"/>
+                            </p:stCondLst>
+                            <p:childTnLst>
+                              <p:par>
+                                <p:cTn id="5" presetID="9" presetClass="entr" presetSubtype="0" fill="hold" grpId="0" nodeType="clickEffect">
+                                  <p:stCondLst>
+                                    <p:cond delay="0"/>
+                                  </p:stCondLst>
+                                  <p:childTnLst>
+                                    <p:set>
+                                      <p:cBhvr>
+                                        <p:cTn id="6" dur="1" fill="hold">
+                                          <p:stCondLst>
+                                            <p:cond delay="0"/>
+                                          </p:stCondLst>
+                                        </p:cTn>
+                                        <p:tgtEl>
+                                          <p:spTgt spid="3">
+                                            <p:txEl>
+                                              <p:pRg st="0" end="0"/>
+                                            </p:txEl>
+                                          </p:spTgt>
+                                        </p:tgtEl>
+                                        <p:attrNameLst>
+                                          <p:attrName>style.visibility</p:attrName>
+                                        </p:attrNameLst>
+                                      </p:cBhvr>
+                                      <p:to>
+                                        <p:strVal val="visible"/>
+                                      </p:to>
+                                    </p:set>
+                                    <p:animEffect transition="in" filter="dissolve">
+                                      <p:cBhvr>
+                                        <p:cTn id="7" dur="500"/>
+                                        <p:tgtEl>
+                                          <p:spTgt spid="3">
+                                            <p:txEl>
+                                              <p:pRg st="0" end="0"/>
+                                            </p:txEl>
+                                          </p:spTgt>
+                                        </p:tgtEl>
+                                      </p:cBhvr>
+                                    </p:animEffect>
+                                  </p:childTnLst>
+                                </p:cTn>
+                              </p:par>
+                            </p:childTnLst>
+                          </p:cTn>
+                        </p:par>
+                      </p:childTnLst>
+                    </p:cTn>
+                  </p:par>
+                  <p:par>
+                    <p:cTn id="8" fill="hold">
+                      <p:stCondLst>
+                        <p:cond delay="indefinite"/>
+                      </p:stCondLst>
+                      <p:childTnLst>
+                        <p:par>
+                          <p:cTn id="9" fill="hold">
+                            <p:stCondLst>
+                              <p:cond delay="0"/>
+                            </p:stCondLst>
+                            <p:childTnLst>
+                              <p:par>
+                                <p:cTn id="10" presetID="9" presetClass="entr" presetSubtype="0" fill="hold" grpId="0" nodeType="clickEffect">
+                                  <p:stCondLst>
+                                    <p:cond delay="0"/>
+                                  </p:stCondLst>
+                                  <p:childTnLst>
+                                    <p:set>
+                                      <p:cBhvr>
+                                        <p:cTn id="11" dur="1" fill="hold">
+                                          <p:stCondLst>
+                                            <p:cond delay="0"/>
+                                          </p:stCondLst>
+                                        </p:cTn>
+                                        <p:tgtEl>
+                                          <p:spTgt spid="3">
+                                            <p:txEl>
+                                              <p:pRg st="1" end="1"/>
+                                            </p:txEl>
+                                          </p:spTgt>
+                                        </p:tgtEl>
+                                        <p:attrNameLst>
+                                          <p:attrName>style.visibility</p:attrName>
+                                        </p:attrNameLst>
+                                      </p:cBhvr>
+                                      <p:to>
+                                        <p:strVal val="visible"/>
+                                      </p:to>
+                                    </p:set>
+                                    <p:animEffect transition="in" filter="dissolve">
+                                      <p:cBhvr>
+                                        <p:cTn id="12" dur="500"/>
+                                        <p:tgtEl>
+                                          <p:spTgt spid="3">
+                                            <p:txEl>
+                                              <p:pRg st="1" end="1"/>
+                                            </p:txEl>
+                                          </p:spTgt>
+                                        </p:tgtEl>
+                                      </p:cBhvr>
+                                    </p:animEffect>
+                                  </p:childTnLst>
+                                </p:cTn>
+                              </p:par>
+                            </p:childTnLst>
+                          </p:cTn>
+                        </p:par>
+                      </p:childTnLst>
+                    </p:cTn>
+                  </p:par>
+                  <p:par>
+                    <p:cTn id="13" fill="hold">
+                      <p:stCondLst>
+                        <p:cond delay="indefinite"/>
+                      </p:stCondLst>
+                      <p:childTnLst>
+                        <p:par>
+                          <p:cTn id="14" fill="hold">
+                            <p:stCondLst>
+                              <p:cond delay="0"/>
+                            </p:stCondLst>
+                            <p:childTnLst>
+                              <p:par>
+                                <p:cTn id="15" presetID="9" presetClass="entr" presetSubtype="0" fill="hold" grpId="0" nodeType="clickEffect">
+                                  <p:stCondLst>
+                                    <p:cond delay="0"/>
+                                  </p:stCondLst>
+                                  <p:childTnLst>
+                                    <p:set>
+                                      <p:cBhvr>
+                                        <p:cTn id="16" dur="1" fill="hold">
+                                          <p:stCondLst>
+                                            <p:cond delay="0"/>
+                                          </p:stCondLst>
+                                        </p:cTn>
+                                        <p:tgtEl>
+                                          <p:spTgt spid="3">
+                                            <p:txEl>
+                                              <p:pRg st="2" end="2"/>
+                                            </p:txEl>
+                                          </p:spTgt>
+                                        </p:tgtEl>
+                                        <p:attrNameLst>
+                                          <p:attrName>style.visibility</p:attrName>
+                                        </p:attrNameLst>
+                                      </p:cBhvr>
+                                      <p:to>
+                                        <p:strVal val="visible"/>
+                                      </p:to>
+                                    </p:set>
+                                    <p:animEffect transition="in" filter="dissolve">
+                                      <p:cBhvr>
+                                        <p:cTn id="17" dur="500"/>
+                                        <p:tgtEl>
+                                          <p:spTgt spid="3">
+                                            <p:txEl>
+                                              <p:pRg st="2" end="2"/>
+                                            </p:txEl>
+                                          </p:spTgt>
+                                        </p:tgtEl>
+                                      </p:cBhvr>
+                                    </p:animEffect>
+                                  </p:childTnLst>
+                                </p:cTn>
+                              </p:par>
+                            </p:childTnLst>
+                          </p:cTn>
+                        </p:par>
+                      </p:childTnLst>
+                    </p:cTn>
+                  </p:par>
+                  <p:par>
+                    <p:cTn id="18" fill="hold">
+                      <p:stCondLst>
+                        <p:cond delay="indefinite"/>
+                      </p:stCondLst>
+                      <p:childTnLst>
+                        <p:par>
+                          <p:cTn id="19" fill="hold">
+                            <p:stCondLst>
+                              <p:cond delay="0"/>
+                            </p:stCondLst>
+                            <p:childTnLst>
+                              <p:par>
+                                <p:cTn id="20" presetID="9" presetClass="exit" presetSubtype="0" fill="hold" grpId="1" nodeType="clickEffect">
+                                  <p:stCondLst>
+                                    <p:cond delay="0"/>
+                                  </p:stCondLst>
+                                  <p:childTnLst>
+                                    <p:animEffect transition="out" filter="dissolve">
+                                      <p:cBhvr>
+                                        <p:cTn id="21" dur="500"/>
+                                        <p:tgtEl>
+                                          <p:spTgt spid="3">
+                                            <p:txEl>
+                                              <p:pRg st="0" end="0"/>
+                                            </p:txEl>
+                                          </p:spTgt>
+                                        </p:tgtEl>
+                                      </p:cBhvr>
+                                    </p:animEffect>
+                                    <p:set>
+                                      <p:cBhvr>
+                                        <p:cTn id="22" dur="1" fill="hold">
+                                          <p:stCondLst>
+                                            <p:cond delay="499"/>
+                                          </p:stCondLst>
+                                        </p:cTn>
+                                        <p:tgtEl>
+                                          <p:spTgt spid="3">
+                                            <p:txEl>
+                                              <p:pRg st="0" end="0"/>
+                                            </p:txEl>
+                                          </p:spTgt>
+                                        </p:tgtEl>
+                                        <p:attrNameLst>
+                                          <p:attrName>style.visibility</p:attrName>
+                                        </p:attrNameLst>
+                                      </p:cBhvr>
+                                      <p:to>
+                                        <p:strVal val="hidden"/>
+                                      </p:to>
+                                    </p:set>
+                                  </p:childTnLst>
+                                </p:cTn>
+                              </p:par>
+                            </p:childTnLst>
+                          </p:cTn>
+                        </p:par>
+                      </p:childTnLst>
+                    </p:cTn>
+                  </p:par>
+                  <p:par>
+                    <p:cTn id="23" fill="hold">
+                      <p:stCondLst>
+                        <p:cond delay="indefinite"/>
+                      </p:stCondLst>
+                      <p:childTnLst>
+                        <p:par>
+                          <p:cTn id="24" fill="hold">
+                            <p:stCondLst>
+                              <p:cond delay="0"/>
+                            </p:stCondLst>
+                            <p:childTnLst>
+                              <p:par>
+                                <p:cTn id="25" presetID="9" presetClass="exit" presetSubtype="0" fill="hold" grpId="1" nodeType="clickEffect">
+                                  <p:stCondLst>
+                                    <p:cond delay="0"/>
+                                  </p:stCondLst>
+                                  <p:childTnLst>
+                                    <p:animEffect transition="out" filter="dissolve">
+                                      <p:cBhvr>
+                                        <p:cTn id="26" dur="500"/>
+                                        <p:tgtEl>
+                                          <p:spTgt spid="3">
+                                            <p:txEl>
+                                              <p:pRg st="1" end="1"/>
+                                            </p:txEl>
+                                          </p:spTgt>
+                                        </p:tgtEl>
+                                      </p:cBhvr>
+                                    </p:animEffect>
+                                    <p:set>
+                                      <p:cBhvr>
+                                        <p:cTn id="27" dur="1" fill="hold">
+                                          <p:stCondLst>
+                                            <p:cond delay="499"/>
+                                          </p:stCondLst>
+                                        </p:cTn>
+                                        <p:tgtEl>
+                                          <p:spTgt spid="3">
+                                            <p:txEl>
+                                              <p:pRg st="1" end="1"/>
+                                            </p:txEl>
+                                          </p:spTgt>
+                                        </p:tgtEl>
+                                        <p:attrNameLst>
+                                          <p:attrName>style.visibility</p:attrName>
+                                        </p:attrNameLst>
+                                      </p:cBhvr>
+                                      <p:to>
+                                        <p:strVal val="hidden"/>
+                                      </p:to>
+                                    </p:set>
+                                  </p:childTnLst>
+                                </p:cTn>
+                              </p:par>
+                            </p:childTnLst>
+                          </p:cTn>
+                        </p:par>
+                      </p:childTnLst>
+                    </p:cTn>
+                  </p:par>
+                  <p:par>
+                    <p:cTn id="28" fill="hold">
+                      <p:stCondLst>
+                        <p:cond delay="indefinite"/>
+                      </p:stCondLst>
+                      <p:childTnLst>
+                        <p:par>
+                          <p:cTn id="29" fill="hold">
+                            <p:stCondLst>
+                              <p:cond delay="0"/>
+                            </p:stCondLst>
+                            <p:childTnLst>
+                              <p:par>
+                                <p:cTn id="30" presetID="9" presetClass="exit" presetSubtype="0" fill="hold" grpId="1" nodeType="clickEffect">
+                                  <p:stCondLst>
+                                    <p:cond delay="0"/>
+                                  </p:stCondLst>
+                                  <p:childTnLst>
+                                    <p:animEffect transition="out" filter="dissolve">
+                                      <p:cBhvr>
+                                        <p:cTn id="31" dur="500"/>
+                                        <p:tgtEl>
+                                          <p:spTgt spid="3">
+                                            <p:txEl>
+                                              <p:pRg st="2" end="2"/>
+                                            </p:txEl>
+                                          </p:spTgt>
+                                        </p:tgtEl>
+                                      </p:cBhvr>
+                                    </p:animEffect>
+                                    <p:set>
+                                      <p:cBhvr>
+                                        <p:cTn id="32" dur="1" fill="hold">
+                                          <p:stCondLst>
+                                            <p:cond delay="499"/>
+                                          </p:stCondLst>
+                                        </p:cTn>
+                                        <p:tgtEl>
+                                          <p:spTgt spid="3">
+                                            <p:txEl>
+                                              <p:pRg st="2" end="2"/>
+                                            </p:txEl>
+                                          </p:spTgt>
+                                        </p:tgtEl>
+                                        <p:attrNameLst>
+                                          <p:attrName>style.visibility</p:attrName>
+                                        </p:attrNameLst>
+                                      </p:cBhvr>
+                                      <p:to>
+                                        <p:strVal val="hidden"/>
+                                      </p:to>
+                                    </p:set>
+                                  </p:childTnLst>
+                                </p:cTn>
+                              </p:par>
+                            </p:childTnLst>
+                          </p:cTn>
+                        </p:par>
+                      </p:childTnLst>
+                    </p:cTn>
+                  </p:par>
+                </p:childTnLst>
+              </p:cTn>
+              <p:prevCondLst>
+                <p:cond evt="onPrev" delay="0">
+                  <p:tgtEl>
+                    <p:sldTgt/>
+                  </p:tgtEl>
+                </p:cond>
+              </p:prevCondLst>
+              <p:nextCondLst>
+                <p:cond evt="onNext" delay="0">
+                  <p:tgtEl>
+                    <p:sldTgt/>
+                  </p:tgtEl>
+                </p:cond>
+              </p:nextCondLst>
+            </p:seq>
+          </p:childTnLst>
+        </p:cTn>
+      </p:par>
+    </p:tnLst>
+    <p:bldLst>
+      <p:bldP spid="3" grpId="0" uiExpand="1" build="p"/>
+      <p:bldP spid="3" grpId="1" uiExpand="1" build="p"/>
+    </p:bldLst>
+  </p:timing>
+</p:sld>
+</file>
+
+<file path=ppt/slides/slide7.xml><?xml version="1.0" encoding="utf-8"?>
+<p:sld xmlns:a="http://schemas.openxmlformats.org/drawingml/2006/main" xmlns:r="http://schemas.openxmlformats.org/officeDocument/2006/relationships" xmlns:p="http://schemas.openxmlformats.org/presentationml/2006/main">
+  <p:cSld>
+    <p:spTree>
+      <p:nvGrpSpPr>
+        <p:cNvPr id="1" name=""/>
+        <p:cNvGrpSpPr/>
+        <p:nvPr/>
+      </p:nvGrpSpPr>
+      <p:grpSpPr>
+        <a:xfrm>
+          <a:off x="0" y="0"/>
+          <a:ext cx="0" cy="0"/>
+          <a:chOff x="0" y="0"/>
+          <a:chExt cx="0" cy="0"/>
+        </a:xfrm>
+      </p:grpSpPr>
+      <p:sp>
+        <p:nvSpPr>
+          <p:cNvPr id="3" name="Content Placeholder 2">
+            <a:extLst>
+              <a:ext uri="{FF2B5EF4-FFF2-40B4-BE49-F238E27FC236}">
+                <a16:creationId xmlns:a16="http://schemas.microsoft.com/office/drawing/2014/main" id="{56B7BAEB-9907-DC45-A478-033AB322DAD1}"/>
+              </a:ext>
+            </a:extLst>
+          </p:cNvPr>
+          <p:cNvSpPr>
+            <a:spLocks noGrp="1"/>
+          </p:cNvSpPr>
+          <p:nvPr>
+            <p:ph idx="1"/>
+          </p:nvPr>
+        </p:nvSpPr>
+        <p:spPr>
+          <a:xfrm>
+            <a:off x="693683" y="1403135"/>
+            <a:ext cx="11067393" cy="5202621"/>
+          </a:xfrm>
+        </p:spPr>
+        <p:txBody>
+          <a:bodyPr>
+            <a:noAutofit/>
+          </a:bodyPr>
+          <a:lstStyle/>
+          <a:p>
+            <a:r>
+              <a:rPr lang="en-US" sz="3200" dirty="0" err="1"/>
+              <a:t>Isso</a:t>
+            </a:r>
+            <a:r>
+              <a:rPr lang="en-US" sz="3200" dirty="0"/>
+              <a:t> </a:t>
+            </a:r>
+            <a:r>
+              <a:rPr lang="en-US" sz="3200" dirty="0" err="1"/>
+              <a:t>quer</a:t>
+            </a:r>
+            <a:r>
+              <a:rPr lang="en-US" sz="3200" dirty="0"/>
+              <a:t> </a:t>
+            </a:r>
+            <a:r>
+              <a:rPr lang="en-US" sz="3200" dirty="0" err="1"/>
+              <a:t>dizer</a:t>
+            </a:r>
+            <a:r>
+              <a:rPr lang="en-US" sz="3200" dirty="0"/>
+              <a:t> que, se </a:t>
+            </a:r>
+            <a:r>
+              <a:rPr lang="en-US" sz="3200" dirty="0" err="1"/>
+              <a:t>você</a:t>
+            </a:r>
+            <a:r>
+              <a:rPr lang="en-US" sz="3200" dirty="0"/>
+              <a:t> </a:t>
+            </a:r>
+            <a:r>
+              <a:rPr lang="en-US" sz="3200" dirty="0" err="1"/>
+              <a:t>colocar</a:t>
+            </a:r>
+            <a:r>
+              <a:rPr lang="en-US" sz="3200" dirty="0"/>
+              <a:t> um </a:t>
+            </a:r>
+            <a:r>
+              <a:rPr lang="en-US" sz="3200" dirty="0" err="1"/>
+              <a:t>servidor</a:t>
+            </a:r>
+            <a:r>
+              <a:rPr lang="en-US" sz="3200" dirty="0"/>
+              <a:t> de chat com um socket TCP </a:t>
+            </a:r>
+            <a:r>
+              <a:rPr lang="en-US" sz="3200" dirty="0" err="1"/>
+              <a:t>escutando</a:t>
+            </a:r>
+            <a:r>
+              <a:rPr lang="en-US" sz="3200" dirty="0"/>
+              <a:t> </a:t>
+            </a:r>
+            <a:r>
+              <a:rPr lang="en-US" sz="3200" dirty="0" err="1"/>
+              <a:t>na</a:t>
+            </a:r>
+            <a:r>
+              <a:rPr lang="en-US" sz="3200" dirty="0"/>
+              <a:t> porta 80, </a:t>
+            </a:r>
+            <a:r>
+              <a:rPr lang="en-US" sz="3200" dirty="0" err="1"/>
+              <a:t>uma</a:t>
+            </a:r>
+            <a:r>
+              <a:rPr lang="en-US" sz="3200" dirty="0"/>
+              <a:t> ferramenta DPI </a:t>
+            </a:r>
+            <a:r>
+              <a:rPr lang="en-US" sz="3200" dirty="0" err="1"/>
+              <a:t>espera</a:t>
+            </a:r>
+            <a:r>
+              <a:rPr lang="en-US" sz="3200" dirty="0"/>
+              <a:t> que </a:t>
+            </a:r>
+            <a:r>
+              <a:rPr lang="en-US" sz="3200" dirty="0" err="1"/>
+              <a:t>em</a:t>
+            </a:r>
+            <a:r>
+              <a:rPr lang="en-US" sz="3200" dirty="0"/>
+              <a:t> </a:t>
+            </a:r>
+            <a:r>
+              <a:rPr lang="en-US" sz="3200" dirty="0" err="1"/>
+              <a:t>tal</a:t>
+            </a:r>
+            <a:r>
+              <a:rPr lang="en-US" sz="3200" dirty="0"/>
+              <a:t> porta </a:t>
+            </a:r>
+            <a:r>
+              <a:rPr lang="en-US" sz="3200" dirty="0" err="1"/>
+              <a:t>seja</a:t>
+            </a:r>
+            <a:r>
+              <a:rPr lang="en-US" sz="3200" dirty="0"/>
+              <a:t> </a:t>
+            </a:r>
+            <a:r>
+              <a:rPr lang="en-US" sz="3200" dirty="0" err="1"/>
+              <a:t>trafegado</a:t>
+            </a:r>
+            <a:r>
+              <a:rPr lang="en-US" sz="3200" dirty="0"/>
+              <a:t> </a:t>
+            </a:r>
+            <a:r>
+              <a:rPr lang="en-US" sz="3200" dirty="0" err="1"/>
+              <a:t>apenas</a:t>
+            </a:r>
+            <a:r>
+              <a:rPr lang="en-US" sz="3200" dirty="0"/>
+              <a:t> </a:t>
+            </a:r>
+            <a:r>
+              <a:rPr lang="en-US" sz="3200" dirty="0" err="1"/>
+              <a:t>pacotes</a:t>
+            </a:r>
+            <a:r>
+              <a:rPr lang="en-US" sz="3200" dirty="0"/>
+              <a:t> HTTP</a:t>
+            </a:r>
+          </a:p>
+          <a:p>
+            <a:r>
+              <a:rPr lang="en-US" sz="3200" i="1" dirty="0" err="1"/>
+              <a:t>Ao</a:t>
+            </a:r>
+            <a:r>
+              <a:rPr lang="en-US" sz="3200" i="1" dirty="0"/>
+              <a:t> </a:t>
+            </a:r>
+            <a:r>
+              <a:rPr lang="en-US" sz="3200" i="1" dirty="0" err="1"/>
+              <a:t>analisar</a:t>
+            </a:r>
+            <a:r>
+              <a:rPr lang="en-US" sz="3200" i="1" dirty="0"/>
+              <a:t> </a:t>
+            </a:r>
+            <a:r>
+              <a:rPr lang="en-US" sz="3200" i="1" dirty="0" err="1"/>
+              <a:t>os</a:t>
+            </a:r>
+            <a:r>
+              <a:rPr lang="en-US" sz="3200" i="1" dirty="0"/>
+              <a:t> </a:t>
+            </a:r>
+            <a:r>
+              <a:rPr lang="en-US" sz="3200" i="1" dirty="0" err="1"/>
+              <a:t>pacotes</a:t>
+            </a:r>
+            <a:r>
+              <a:rPr lang="en-US" sz="3200" i="1" dirty="0"/>
+              <a:t> </a:t>
+            </a:r>
+            <a:r>
+              <a:rPr lang="en-US" sz="3200" i="1" dirty="0" err="1"/>
+              <a:t>transmitidos</a:t>
+            </a:r>
+            <a:r>
+              <a:rPr lang="en-US" sz="3200" i="1" dirty="0"/>
+              <a:t>, </a:t>
+            </a:r>
+            <a:r>
+              <a:rPr lang="en-US" sz="3200" i="1" dirty="0" err="1"/>
+              <a:t>descobrirá</a:t>
+            </a:r>
+            <a:r>
+              <a:rPr lang="en-US" sz="3200" i="1" dirty="0"/>
+              <a:t> que o </a:t>
+            </a:r>
+            <a:r>
+              <a:rPr lang="en-US" sz="3200" i="1" dirty="0" err="1"/>
+              <a:t>protocolo</a:t>
+            </a:r>
+            <a:r>
+              <a:rPr lang="en-US" sz="3200" i="1" dirty="0"/>
+              <a:t> </a:t>
+            </a:r>
+            <a:r>
+              <a:rPr lang="en-US" sz="3200" i="1" dirty="0" err="1"/>
+              <a:t>usado</a:t>
+            </a:r>
+            <a:r>
+              <a:rPr lang="en-US" sz="3200" i="1" dirty="0"/>
+              <a:t> </a:t>
+            </a:r>
+            <a:r>
+              <a:rPr lang="en-US" sz="3200" i="1" dirty="0" err="1"/>
+              <a:t>não</a:t>
+            </a:r>
+            <a:r>
+              <a:rPr lang="en-US" sz="3200" i="1" dirty="0"/>
+              <a:t> </a:t>
+            </a:r>
+            <a:r>
+              <a:rPr lang="en-US" sz="3200" i="1" dirty="0" err="1"/>
+              <a:t>é</a:t>
+            </a:r>
+            <a:r>
+              <a:rPr lang="en-US" sz="3200" i="1" dirty="0"/>
+              <a:t> HTTP e </a:t>
+            </a:r>
+            <a:r>
+              <a:rPr lang="en-US" sz="3200" i="1" dirty="0" err="1"/>
+              <a:t>pode</a:t>
+            </a:r>
+            <a:r>
+              <a:rPr lang="en-US" sz="3200" i="1" dirty="0"/>
+              <a:t> </a:t>
+            </a:r>
+            <a:r>
+              <a:rPr lang="en-US" sz="3200" i="1" dirty="0" err="1"/>
+              <a:t>então</a:t>
+            </a:r>
+            <a:r>
+              <a:rPr lang="en-US" sz="3200" i="1" dirty="0"/>
+              <a:t> </a:t>
+            </a:r>
+            <a:r>
+              <a:rPr lang="en-US" sz="3200" i="1" dirty="0" err="1"/>
+              <a:t>bloquerar</a:t>
+            </a:r>
+            <a:r>
+              <a:rPr lang="en-US" sz="3200" i="1" dirty="0"/>
+              <a:t> o </a:t>
+            </a:r>
+            <a:r>
+              <a:rPr lang="en-US" sz="3200" i="1" dirty="0" err="1"/>
+              <a:t>tráfego</a:t>
+            </a:r>
+            <a:endParaRPr lang="en-US" sz="3200" i="1" dirty="0"/>
+          </a:p>
+        </p:txBody>
+      </p:sp>
+      <p:sp>
+        <p:nvSpPr>
+          <p:cNvPr id="4" name="Rectangle 3">
+            <a:extLst>
+              <a:ext uri="{FF2B5EF4-FFF2-40B4-BE49-F238E27FC236}">
+                <a16:creationId xmlns:a16="http://schemas.microsoft.com/office/drawing/2014/main" id="{AA712CCC-0F51-5147-857A-F33544398307}"/>
+              </a:ext>
+            </a:extLst>
+          </p:cNvPr>
+          <p:cNvSpPr/>
+          <p:nvPr/>
+        </p:nvSpPr>
+        <p:spPr>
+          <a:xfrm>
+            <a:off x="0" y="113777"/>
+            <a:ext cx="12123683" cy="1015663"/>
+          </a:xfrm>
+          <a:prstGeom prst="rect">
+            <a:avLst/>
+          </a:prstGeom>
+          <a:noFill/>
+        </p:spPr>
+        <p:txBody>
+          <a:bodyPr wrap="square" lIns="91440" tIns="45720" rIns="91440" bIns="45720">
+            <a:spAutoFit/>
+          </a:bodyPr>
+          <a:lstStyle/>
+          <a:p>
+            <a:pPr algn="ctr"/>
+            <a:r>
+              <a:rPr lang="en-US" sz="6000" b="1" cap="none" spc="0" dirty="0" err="1">
+                <a:ln w="0"/>
+                <a:solidFill>
+                  <a:schemeClr val="tx1"/>
+                </a:solidFill>
+                <a:effectLst>
+                  <a:outerShdw blurRad="38100" dist="19050" dir="2700000" algn="tl" rotWithShape="0">
+                    <a:schemeClr val="dk1">
+                      <a:alpha val="40000"/>
+                    </a:schemeClr>
+                  </a:outerShdw>
+                </a:effectLst>
+              </a:rPr>
+              <a:t>Errado</a:t>
+            </a:r>
+            <a:r>
+              <a:rPr lang="en-US" sz="6000" b="1" cap="none" spc="0" dirty="0">
+                <a:ln w="0"/>
+                <a:solidFill>
+                  <a:schemeClr val="tx1"/>
+                </a:solidFill>
+                <a:effectLst>
+                  <a:outerShdw blurRad="38100" dist="19050" dir="2700000" algn="tl" rotWithShape="0">
+                    <a:schemeClr val="dk1">
+                      <a:alpha val="40000"/>
+                    </a:schemeClr>
+                  </a:outerShdw>
+                </a:effectLst>
+              </a:rPr>
+              <a:t>!</a:t>
+            </a:r>
+          </a:p>
+        </p:txBody>
+      </p:sp>
+    </p:spTree>
+    <p:extLst>
+      <p:ext uri="{BB962C8B-B14F-4D97-AF65-F5344CB8AC3E}">
+        <p14:creationId xmlns:p14="http://schemas.microsoft.com/office/powerpoint/2010/main" val="307941259"/>
+      </p:ext>
+    </p:extLst>
+  </p:cSld>
+  <p:clrMapOvr>
+    <a:masterClrMapping/>
+  </p:clrMapOvr>
+  <p:timing>
+    <p:tnLst>
+      <p:par>
+        <p:cTn id="1" dur="indefinite" restart="never" nodeType="tmRoot">
+          <p:childTnLst>
+            <p:seq concurrent="1" nextAc="seek">
+              <p:cTn id="2" dur="indefinite" nodeType="mainSeq">
+                <p:childTnLst>
+                  <p:par>
+                    <p:cTn id="3" fill="hold">
+                      <p:stCondLst>
+                        <p:cond delay="indefinite"/>
+                      </p:stCondLst>
+                      <p:childTnLst>
+                        <p:par>
+                          <p:cTn id="4" fill="hold">
+                            <p:stCondLst>
+                              <p:cond delay="0"/>
+                            </p:stCondLst>
+                            <p:childTnLst>
+                              <p:par>
+                                <p:cTn id="5" presetID="9" presetClass="entr" presetSubtype="0" fill="hold" grpId="0" nodeType="clickEffect">
+                                  <p:stCondLst>
+                                    <p:cond delay="0"/>
+                                  </p:stCondLst>
+                                  <p:childTnLst>
+                                    <p:set>
+                                      <p:cBhvr>
+                                        <p:cTn id="6" dur="1" fill="hold">
+                                          <p:stCondLst>
+                                            <p:cond delay="0"/>
+                                          </p:stCondLst>
+                                        </p:cTn>
+                                        <p:tgtEl>
+                                          <p:spTgt spid="3">
+                                            <p:txEl>
+                                              <p:pRg st="0" end="0"/>
+                                            </p:txEl>
+                                          </p:spTgt>
+                                        </p:tgtEl>
+                                        <p:attrNameLst>
+                                          <p:attrName>style.visibility</p:attrName>
+                                        </p:attrNameLst>
+                                      </p:cBhvr>
+                                      <p:to>
+                                        <p:strVal val="visible"/>
+                                      </p:to>
+                                    </p:set>
+                                    <p:animEffect transition="in" filter="dissolve">
+                                      <p:cBhvr>
+                                        <p:cTn id="7" dur="500"/>
+                                        <p:tgtEl>
+                                          <p:spTgt spid="3">
+                                            <p:txEl>
+                                              <p:pRg st="0" end="0"/>
+                                            </p:txEl>
+                                          </p:spTgt>
+                                        </p:tgtEl>
+                                      </p:cBhvr>
+                                    </p:animEffect>
+                                  </p:childTnLst>
+                                </p:cTn>
+                              </p:par>
+                            </p:childTnLst>
+                          </p:cTn>
+                        </p:par>
+                      </p:childTnLst>
+                    </p:cTn>
+                  </p:par>
+                  <p:par>
+                    <p:cTn id="8" fill="hold">
+                      <p:stCondLst>
+                        <p:cond delay="indefinite"/>
+                      </p:stCondLst>
+                      <p:childTnLst>
+                        <p:par>
+                          <p:cTn id="9" fill="hold">
+                            <p:stCondLst>
+                              <p:cond delay="0"/>
+                            </p:stCondLst>
+                            <p:childTnLst>
+                              <p:par>
+                                <p:cTn id="10" presetID="9" presetClass="entr" presetSubtype="0" fill="hold" grpId="0" nodeType="clickEffect">
+                                  <p:stCondLst>
+                                    <p:cond delay="0"/>
+                                  </p:stCondLst>
+                                  <p:childTnLst>
+                                    <p:set>
+                                      <p:cBhvr>
+                                        <p:cTn id="11" dur="1" fill="hold">
+                                          <p:stCondLst>
+                                            <p:cond delay="0"/>
+                                          </p:stCondLst>
+                                        </p:cTn>
+                                        <p:tgtEl>
+                                          <p:spTgt spid="3">
+                                            <p:txEl>
+                                              <p:pRg st="1" end="1"/>
+                                            </p:txEl>
+                                          </p:spTgt>
+                                        </p:tgtEl>
+                                        <p:attrNameLst>
+                                          <p:attrName>style.visibility</p:attrName>
+                                        </p:attrNameLst>
+                                      </p:cBhvr>
+                                      <p:to>
+                                        <p:strVal val="visible"/>
+                                      </p:to>
+                                    </p:set>
+                                    <p:animEffect transition="in" filter="dissolve">
+                                      <p:cBhvr>
+                                        <p:cTn id="12" dur="500"/>
+                                        <p:tgtEl>
+                                          <p:spTgt spid="3">
+                                            <p:txEl>
+                                              <p:pRg st="1" end="1"/>
+                                            </p:txEl>
+                                          </p:spTgt>
+                                        </p:tgtEl>
+                                      </p:cBhvr>
+                                    </p:animEffect>
+                                  </p:childTnLst>
+                                </p:cTn>
+                              </p:par>
+                            </p:childTnLst>
+                          </p:cTn>
+                        </p:par>
+                      </p:childTnLst>
+                    </p:cTn>
+                  </p:par>
+                  <p:par>
+                    <p:cTn id="13" fill="hold">
+                      <p:stCondLst>
+                        <p:cond delay="indefinite"/>
+                      </p:stCondLst>
+                      <p:childTnLst>
+                        <p:par>
+                          <p:cTn id="14" fill="hold">
+                            <p:stCondLst>
+                              <p:cond delay="0"/>
+                            </p:stCondLst>
+                            <p:childTnLst>
+                              <p:par>
+                                <p:cTn id="15" presetID="9" presetClass="exit" presetSubtype="0" fill="hold" grpId="1" nodeType="clickEffect">
+                                  <p:stCondLst>
+                                    <p:cond delay="0"/>
+                                  </p:stCondLst>
+                                  <p:childTnLst>
+                                    <p:animEffect transition="out" filter="dissolve">
+                                      <p:cBhvr>
+                                        <p:cTn id="16" dur="500"/>
+                                        <p:tgtEl>
+                                          <p:spTgt spid="3">
+                                            <p:txEl>
+                                              <p:pRg st="0" end="0"/>
+                                            </p:txEl>
+                                          </p:spTgt>
+                                        </p:tgtEl>
+                                      </p:cBhvr>
+                                    </p:animEffect>
+                                    <p:set>
+                                      <p:cBhvr>
+                                        <p:cTn id="17" dur="1" fill="hold">
+                                          <p:stCondLst>
+                                            <p:cond delay="499"/>
+                                          </p:stCondLst>
+                                        </p:cTn>
+                                        <p:tgtEl>
+                                          <p:spTgt spid="3">
+                                            <p:txEl>
+                                              <p:pRg st="0" end="0"/>
+                                            </p:txEl>
+                                          </p:spTgt>
+                                        </p:tgtEl>
+                                        <p:attrNameLst>
+                                          <p:attrName>style.visibility</p:attrName>
+                                        </p:attrNameLst>
+                                      </p:cBhvr>
+                                      <p:to>
+                                        <p:strVal val="hidden"/>
+                                      </p:to>
+                                    </p:set>
+                                  </p:childTnLst>
+                                </p:cTn>
+                              </p:par>
+                            </p:childTnLst>
+                          </p:cTn>
+                        </p:par>
+                      </p:childTnLst>
+                    </p:cTn>
+                  </p:par>
+                  <p:par>
+                    <p:cTn id="18" fill="hold">
+                      <p:stCondLst>
+                        <p:cond delay="indefinite"/>
+                      </p:stCondLst>
+                      <p:childTnLst>
+                        <p:par>
+                          <p:cTn id="19" fill="hold">
+                            <p:stCondLst>
+                              <p:cond delay="0"/>
+                            </p:stCondLst>
+                            <p:childTnLst>
+                              <p:par>
+                                <p:cTn id="20" presetID="9" presetClass="exit" presetSubtype="0" fill="hold" grpId="1" nodeType="clickEffect">
+                                  <p:stCondLst>
+                                    <p:cond delay="0"/>
+                                  </p:stCondLst>
+                                  <p:childTnLst>
+                                    <p:animEffect transition="out" filter="dissolve">
+                                      <p:cBhvr>
+                                        <p:cTn id="21" dur="500"/>
+                                        <p:tgtEl>
+                                          <p:spTgt spid="3">
+                                            <p:txEl>
+                                              <p:pRg st="1" end="1"/>
+                                            </p:txEl>
+                                          </p:spTgt>
+                                        </p:tgtEl>
+                                      </p:cBhvr>
+                                    </p:animEffect>
+                                    <p:set>
+                                      <p:cBhvr>
+                                        <p:cTn id="22" dur="1" fill="hold">
+                                          <p:stCondLst>
+                                            <p:cond delay="499"/>
+                                          </p:stCondLst>
+                                        </p:cTn>
+                                        <p:tgtEl>
+                                          <p:spTgt spid="3">
+                                            <p:txEl>
+                                              <p:pRg st="1" end="1"/>
+                                            </p:txEl>
+                                          </p:spTgt>
+                                        </p:tgtEl>
+                                        <p:attrNameLst>
+                                          <p:attrName>style.visibility</p:attrName>
+                                        </p:attrNameLst>
+                                      </p:cBhvr>
+                                      <p:to>
+                                        <p:strVal val="hidden"/>
+                                      </p:to>
+                                    </p:set>
+                                  </p:childTnLst>
+                                </p:cTn>
+                              </p:par>
+                            </p:childTnLst>
+                          </p:cTn>
+                        </p:par>
+                      </p:childTnLst>
+                    </p:cTn>
+                  </p:par>
+                </p:childTnLst>
+              </p:cTn>
+              <p:prevCondLst>
+                <p:cond evt="onPrev" delay="0">
+                  <p:tgtEl>
+                    <p:sldTgt/>
+                  </p:tgtEl>
+                </p:cond>
+              </p:prevCondLst>
+              <p:nextCondLst>
+                <p:cond evt="onNext" delay="0">
+                  <p:tgtEl>
+                    <p:sldTgt/>
+                  </p:tgtEl>
+                </p:cond>
+              </p:nextCondLst>
+            </p:seq>
+          </p:childTnLst>
+        </p:cTn>
+      </p:par>
+    </p:tnLst>
+    <p:bldLst>
+      <p:bldP spid="3" grpId="0" uiExpand="1" build="p"/>
+      <p:bldP spid="3" grpId="1" uiExpand="1" build="p"/>
+    </p:bldLst>
+  </p:timing>
+</p:sld>
+</file>
+
+<file path=ppt/slides/slide8.xml><?xml version="1.0" encoding="utf-8"?>
+<p:sld xmlns:a="http://schemas.openxmlformats.org/drawingml/2006/main" xmlns:r="http://schemas.openxmlformats.org/officeDocument/2006/relationships" xmlns:p="http://schemas.openxmlformats.org/presentationml/2006/main">
+  <p:cSld>
+    <p:spTree>
+      <p:nvGrpSpPr>
+        <p:cNvPr id="1" name=""/>
+        <p:cNvGrpSpPr/>
+        <p:nvPr/>
+      </p:nvGrpSpPr>
+      <p:grpSpPr>
+        <a:xfrm>
+          <a:off x="0" y="0"/>
+          <a:ext cx="0" cy="0"/>
+          <a:chOff x="0" y="0"/>
+          <a:chExt cx="0" cy="0"/>
+        </a:xfrm>
+      </p:grpSpPr>
+      <p:sp>
+        <p:nvSpPr>
+          <p:cNvPr id="3" name="Content Placeholder 2">
+            <a:extLst>
+              <a:ext uri="{FF2B5EF4-FFF2-40B4-BE49-F238E27FC236}">
+                <a16:creationId xmlns:a16="http://schemas.microsoft.com/office/drawing/2014/main" id="{56B7BAEB-9907-DC45-A478-033AB322DAD1}"/>
+              </a:ext>
+            </a:extLst>
+          </p:cNvPr>
+          <p:cNvSpPr>
+            <a:spLocks noGrp="1"/>
+          </p:cNvSpPr>
+          <p:nvPr>
+            <p:ph idx="1"/>
+          </p:nvPr>
+        </p:nvSpPr>
+        <p:spPr>
+          <a:xfrm>
+            <a:off x="693683" y="1403135"/>
+            <a:ext cx="11067393" cy="5202621"/>
+          </a:xfrm>
+        </p:spPr>
+        <p:txBody>
+          <a:bodyPr>
+            <a:noAutofit/>
+          </a:bodyPr>
+          <a:lstStyle/>
+          <a:p>
+            <a:r>
+              <a:rPr lang="en-US" sz="3200" i="1" dirty="0">
+                <a:hlinkClick r:id="rId2"/>
+              </a:rPr>
+              <a:t>Clientes de BitTorrent por exemplo, aplicavam esta técnica de usar a porta 80 para burlar o firewall</a:t>
+            </a:r>
+            <a:endParaRPr lang="en-US" sz="3200" i="1" dirty="0"/>
+          </a:p>
+          <a:p>
+            <a:r>
+              <a:rPr lang="en-US" sz="3200" i="1" dirty="0"/>
+              <a:t>Ferramentas de DPI </a:t>
+            </a:r>
+            <a:r>
+              <a:rPr lang="en-US" sz="3200" i="1" dirty="0" err="1"/>
+              <a:t>podem</a:t>
+            </a:r>
+            <a:r>
+              <a:rPr lang="en-US" sz="3200" i="1" dirty="0"/>
+              <a:t> </a:t>
+            </a:r>
+            <a:r>
+              <a:rPr lang="en-US" sz="3200" i="1" dirty="0" err="1"/>
+              <a:t>ser</a:t>
+            </a:r>
+            <a:r>
+              <a:rPr lang="en-US" sz="3200" i="1" dirty="0"/>
+              <a:t> </a:t>
+            </a:r>
+            <a:r>
+              <a:rPr lang="en-US" sz="3200" i="1" dirty="0" err="1"/>
+              <a:t>usadas</a:t>
+            </a:r>
+            <a:r>
+              <a:rPr lang="en-US" sz="3200" i="1" dirty="0"/>
+              <a:t> para </a:t>
+            </a:r>
+            <a:r>
+              <a:rPr lang="en-US" sz="3200" i="1" dirty="0" err="1"/>
+              <a:t>verificar</a:t>
+            </a:r>
+            <a:r>
+              <a:rPr lang="en-US" sz="3200" i="1" dirty="0"/>
+              <a:t> se o </a:t>
+            </a:r>
+            <a:r>
+              <a:rPr lang="en-US" sz="3200" i="1" dirty="0" err="1"/>
+              <a:t>tráfego</a:t>
+            </a:r>
+            <a:r>
+              <a:rPr lang="en-US" sz="3200" i="1" dirty="0"/>
+              <a:t> </a:t>
+            </a:r>
+            <a:r>
+              <a:rPr lang="en-US" sz="3200" i="1" dirty="0" err="1"/>
+              <a:t>é</a:t>
+            </a:r>
+            <a:r>
+              <a:rPr lang="en-US" sz="3200" i="1" dirty="0"/>
+              <a:t> torrent, </a:t>
+            </a:r>
+            <a:r>
+              <a:rPr lang="en-US" sz="3200" i="1" dirty="0" err="1"/>
+              <a:t>independente</a:t>
+            </a:r>
+            <a:r>
+              <a:rPr lang="en-US" sz="3200" i="1" dirty="0"/>
+              <a:t> de </a:t>
+            </a:r>
+            <a:r>
+              <a:rPr lang="en-US" sz="3200" i="1" dirty="0" err="1"/>
+              <a:t>qual</a:t>
+            </a:r>
+            <a:r>
+              <a:rPr lang="en-US" sz="3200" i="1" dirty="0"/>
+              <a:t> porta </a:t>
+            </a:r>
+            <a:r>
+              <a:rPr lang="en-US" sz="3200" i="1" dirty="0" err="1"/>
+              <a:t>está</a:t>
+            </a:r>
+            <a:r>
+              <a:rPr lang="en-US" sz="3200" i="1" dirty="0"/>
+              <a:t> </a:t>
+            </a:r>
+            <a:r>
+              <a:rPr lang="en-US" sz="3200" i="1" dirty="0" err="1"/>
+              <a:t>sendo</a:t>
+            </a:r>
+            <a:r>
+              <a:rPr lang="en-US" sz="3200" i="1" dirty="0"/>
+              <a:t> </a:t>
+            </a:r>
+            <a:r>
+              <a:rPr lang="en-US" sz="3200" i="1" dirty="0" err="1"/>
+              <a:t>usada</a:t>
+            </a:r>
+            <a:endParaRPr lang="en-US" sz="3200" i="1" dirty="0"/>
+          </a:p>
+          <a:p>
+            <a:r>
+              <a:rPr lang="en-US" sz="3200" i="1" dirty="0">
+                <a:hlinkClick r:id="rId3"/>
+              </a:rPr>
+              <a:t>Já existem até mesmo trabalhos para identificar tráfego de redes P2P como BitTorrent, mesmo que esteja criptografado</a:t>
+            </a:r>
+            <a:endParaRPr lang="en-US" sz="3200" i="1" dirty="0"/>
+          </a:p>
+        </p:txBody>
+      </p:sp>
+      <p:sp>
+        <p:nvSpPr>
+          <p:cNvPr id="4" name="Rectangle 3">
+            <a:extLst>
+              <a:ext uri="{FF2B5EF4-FFF2-40B4-BE49-F238E27FC236}">
+                <a16:creationId xmlns:a16="http://schemas.microsoft.com/office/drawing/2014/main" id="{AA712CCC-0F51-5147-857A-F33544398307}"/>
+              </a:ext>
+            </a:extLst>
+          </p:cNvPr>
+          <p:cNvSpPr/>
+          <p:nvPr/>
+        </p:nvSpPr>
+        <p:spPr>
+          <a:xfrm>
+            <a:off x="0" y="113777"/>
+            <a:ext cx="12123683" cy="1015663"/>
+          </a:xfrm>
+          <a:prstGeom prst="rect">
+            <a:avLst/>
+          </a:prstGeom>
+          <a:noFill/>
+        </p:spPr>
+        <p:txBody>
+          <a:bodyPr wrap="square" lIns="91440" tIns="45720" rIns="91440" bIns="45720">
+            <a:spAutoFit/>
+          </a:bodyPr>
+          <a:lstStyle/>
+          <a:p>
+            <a:pPr algn="ctr"/>
+            <a:r>
+              <a:rPr lang="en-US" sz="6000" b="1" cap="none" spc="0" dirty="0" err="1">
+                <a:ln w="0"/>
+                <a:solidFill>
+                  <a:schemeClr val="tx1"/>
+                </a:solidFill>
+                <a:effectLst>
+                  <a:outerShdw blurRad="38100" dist="19050" dir="2700000" algn="tl" rotWithShape="0">
+                    <a:schemeClr val="dk1">
+                      <a:alpha val="40000"/>
+                    </a:schemeClr>
+                  </a:outerShdw>
+                </a:effectLst>
+              </a:rPr>
+              <a:t>Errado</a:t>
+            </a:r>
+            <a:r>
+              <a:rPr lang="en-US" sz="6000" b="1" cap="none" spc="0" dirty="0">
+                <a:ln w="0"/>
+                <a:solidFill>
+                  <a:schemeClr val="tx1"/>
+                </a:solidFill>
+                <a:effectLst>
+                  <a:outerShdw blurRad="38100" dist="19050" dir="2700000" algn="tl" rotWithShape="0">
+                    <a:schemeClr val="dk1">
+                      <a:alpha val="40000"/>
+                    </a:schemeClr>
+                  </a:outerShdw>
+                </a:effectLst>
+              </a:rPr>
+              <a:t>!</a:t>
+            </a:r>
+          </a:p>
+        </p:txBody>
+      </p:sp>
+    </p:spTree>
+    <p:extLst>
+      <p:ext uri="{BB962C8B-B14F-4D97-AF65-F5344CB8AC3E}">
+        <p14:creationId xmlns:p14="http://schemas.microsoft.com/office/powerpoint/2010/main" val="3540147647"/>
+      </p:ext>
+    </p:extLst>
+  </p:cSld>
+  <p:clrMapOvr>
+    <a:masterClrMapping/>
+  </p:clrMapOvr>
+  <p:timing>
+    <p:tnLst>
+      <p:par>
+        <p:cTn id="1" dur="indefinite" restart="never" nodeType="tmRoot">
+          <p:childTnLst>
+            <p:seq concurrent="1" nextAc="seek">
+              <p:cTn id="2" dur="indefinite" nodeType="mainSeq">
+                <p:childTnLst>
+                  <p:par>
+                    <p:cTn id="3" fill="hold">
+                      <p:stCondLst>
+                        <p:cond delay="indefinite"/>
+                      </p:stCondLst>
+                      <p:childTnLst>
+                        <p:par>
+                          <p:cTn id="4" fill="hold">
+                            <p:stCondLst>
+                              <p:cond delay="0"/>
+                            </p:stCondLst>
+                            <p:childTnLst>
+                              <p:par>
+                                <p:cTn id="5" presetID="9" presetClass="entr" presetSubtype="0" fill="hold" grpId="0" nodeType="clickEffect">
+                                  <p:stCondLst>
+                                    <p:cond delay="0"/>
+                                  </p:stCondLst>
+                                  <p:childTnLst>
+                                    <p:set>
+                                      <p:cBhvr>
+                                        <p:cTn id="6" dur="1" fill="hold">
+                                          <p:stCondLst>
+                                            <p:cond delay="0"/>
+                                          </p:stCondLst>
+                                        </p:cTn>
+                                        <p:tgtEl>
+                                          <p:spTgt spid="3">
+                                            <p:txEl>
+                                              <p:pRg st="0" end="0"/>
+                                            </p:txEl>
+                                          </p:spTgt>
+                                        </p:tgtEl>
+                                        <p:attrNameLst>
+                                          <p:attrName>style.visibility</p:attrName>
+                                        </p:attrNameLst>
+                                      </p:cBhvr>
+                                      <p:to>
+                                        <p:strVal val="visible"/>
+                                      </p:to>
+                                    </p:set>
+                                    <p:animEffect transition="in" filter="dissolve">
+                                      <p:cBhvr>
+                                        <p:cTn id="7" dur="500"/>
+                                        <p:tgtEl>
+                                          <p:spTgt spid="3">
+                                            <p:txEl>
+                                              <p:pRg st="0" end="0"/>
+                                            </p:txEl>
+                                          </p:spTgt>
+                                        </p:tgtEl>
+                                      </p:cBhvr>
+                                    </p:animEffect>
+                                  </p:childTnLst>
+                                </p:cTn>
+                              </p:par>
+                            </p:childTnLst>
+                          </p:cTn>
+                        </p:par>
+                      </p:childTnLst>
+                    </p:cTn>
+                  </p:par>
+                  <p:par>
+                    <p:cTn id="8" fill="hold">
+                      <p:stCondLst>
+                        <p:cond delay="indefinite"/>
+                      </p:stCondLst>
+                      <p:childTnLst>
+                        <p:par>
+                          <p:cTn id="9" fill="hold">
+                            <p:stCondLst>
+                              <p:cond delay="0"/>
+                            </p:stCondLst>
+                            <p:childTnLst>
+                              <p:par>
+                                <p:cTn id="10" presetID="9" presetClass="entr" presetSubtype="0" fill="hold" grpId="0" nodeType="clickEffect">
+                                  <p:stCondLst>
+                                    <p:cond delay="0"/>
+                                  </p:stCondLst>
+                                  <p:childTnLst>
+                                    <p:set>
+                                      <p:cBhvr>
+                                        <p:cTn id="11" dur="1" fill="hold">
+                                          <p:stCondLst>
+                                            <p:cond delay="0"/>
+                                          </p:stCondLst>
+                                        </p:cTn>
+                                        <p:tgtEl>
+                                          <p:spTgt spid="3">
+                                            <p:txEl>
+                                              <p:pRg st="1" end="1"/>
+                                            </p:txEl>
+                                          </p:spTgt>
+                                        </p:tgtEl>
+                                        <p:attrNameLst>
+                                          <p:attrName>style.visibility</p:attrName>
+                                        </p:attrNameLst>
+                                      </p:cBhvr>
+                                      <p:to>
+                                        <p:strVal val="visible"/>
+                                      </p:to>
+                                    </p:set>
+                                    <p:animEffect transition="in" filter="dissolve">
+                                      <p:cBhvr>
+                                        <p:cTn id="12" dur="500"/>
+                                        <p:tgtEl>
+                                          <p:spTgt spid="3">
+                                            <p:txEl>
+                                              <p:pRg st="1" end="1"/>
+                                            </p:txEl>
+                                          </p:spTgt>
+                                        </p:tgtEl>
+                                      </p:cBhvr>
+                                    </p:animEffect>
+                                  </p:childTnLst>
+                                </p:cTn>
+                              </p:par>
+                            </p:childTnLst>
+                          </p:cTn>
+                        </p:par>
+                      </p:childTnLst>
+                    </p:cTn>
+                  </p:par>
+                  <p:par>
+                    <p:cTn id="13" fill="hold">
+                      <p:stCondLst>
+                        <p:cond delay="indefinite"/>
+                      </p:stCondLst>
+                      <p:childTnLst>
+                        <p:par>
+                          <p:cTn id="14" fill="hold">
+                            <p:stCondLst>
+                              <p:cond delay="0"/>
+                            </p:stCondLst>
+                            <p:childTnLst>
+                              <p:par>
+                                <p:cTn id="15" presetID="9" presetClass="entr" presetSubtype="0" fill="hold" grpId="0" nodeType="clickEffect">
+                                  <p:stCondLst>
+                                    <p:cond delay="0"/>
+                                  </p:stCondLst>
+                                  <p:childTnLst>
+                                    <p:set>
+                                      <p:cBhvr>
+                                        <p:cTn id="16" dur="1" fill="hold">
+                                          <p:stCondLst>
+                                            <p:cond delay="0"/>
+                                          </p:stCondLst>
+                                        </p:cTn>
+                                        <p:tgtEl>
+                                          <p:spTgt spid="3">
+                                            <p:txEl>
+                                              <p:pRg st="2" end="2"/>
+                                            </p:txEl>
+                                          </p:spTgt>
+                                        </p:tgtEl>
+                                        <p:attrNameLst>
+                                          <p:attrName>style.visibility</p:attrName>
+                                        </p:attrNameLst>
+                                      </p:cBhvr>
+                                      <p:to>
+                                        <p:strVal val="visible"/>
+                                      </p:to>
+                                    </p:set>
+                                    <p:animEffect transition="in" filter="dissolve">
+                                      <p:cBhvr>
+                                        <p:cTn id="17" dur="500"/>
+                                        <p:tgtEl>
+                                          <p:spTgt spid="3">
+                                            <p:txEl>
+                                              <p:pRg st="2" end="2"/>
+                                            </p:txEl>
+                                          </p:spTgt>
+                                        </p:tgtEl>
+                                      </p:cBhvr>
+                                    </p:animEffect>
+                                  </p:childTnLst>
+                                </p:cTn>
+                              </p:par>
+                            </p:childTnLst>
+                          </p:cTn>
+                        </p:par>
+                      </p:childTnLst>
+                    </p:cTn>
+                  </p:par>
+                  <p:par>
+                    <p:cTn id="18" fill="hold">
+                      <p:stCondLst>
+                        <p:cond delay="indefinite"/>
+                      </p:stCondLst>
+                      <p:childTnLst>
+                        <p:par>
+                          <p:cTn id="19" fill="hold">
+                            <p:stCondLst>
+                              <p:cond delay="0"/>
+                            </p:stCondLst>
+                            <p:childTnLst>
+                              <p:par>
+                                <p:cTn id="20" presetID="9" presetClass="exit" presetSubtype="0" fill="hold" grpId="1" nodeType="clickEffect">
+                                  <p:stCondLst>
+                                    <p:cond delay="0"/>
+                                  </p:stCondLst>
+                                  <p:childTnLst>
+                                    <p:animEffect transition="out" filter="dissolve">
+                                      <p:cBhvr>
+                                        <p:cTn id="21" dur="500"/>
+                                        <p:tgtEl>
+                                          <p:spTgt spid="3">
+                                            <p:txEl>
+                                              <p:pRg st="0" end="0"/>
+                                            </p:txEl>
+                                          </p:spTgt>
+                                        </p:tgtEl>
+                                      </p:cBhvr>
+                                    </p:animEffect>
+                                    <p:set>
+                                      <p:cBhvr>
+                                        <p:cTn id="22" dur="1" fill="hold">
+                                          <p:stCondLst>
+                                            <p:cond delay="499"/>
+                                          </p:stCondLst>
+                                        </p:cTn>
+                                        <p:tgtEl>
+                                          <p:spTgt spid="3">
+                                            <p:txEl>
+                                              <p:pRg st="0" end="0"/>
+                                            </p:txEl>
+                                          </p:spTgt>
+                                        </p:tgtEl>
+                                        <p:attrNameLst>
+                                          <p:attrName>style.visibility</p:attrName>
+                                        </p:attrNameLst>
+                                      </p:cBhvr>
+                                      <p:to>
+                                        <p:strVal val="hidden"/>
+                                      </p:to>
+                                    </p:set>
+                                  </p:childTnLst>
+                                </p:cTn>
+                              </p:par>
+                            </p:childTnLst>
+                          </p:cTn>
+                        </p:par>
+                      </p:childTnLst>
+                    </p:cTn>
+                  </p:par>
+                  <p:par>
+                    <p:cTn id="23" fill="hold">
+                      <p:stCondLst>
+                        <p:cond delay="indefinite"/>
+                      </p:stCondLst>
+                      <p:childTnLst>
+                        <p:par>
+                          <p:cTn id="24" fill="hold">
+                            <p:stCondLst>
+                              <p:cond delay="0"/>
+                            </p:stCondLst>
+                            <p:childTnLst>
+                              <p:par>
+                                <p:cTn id="25" presetID="9" presetClass="exit" presetSubtype="0" fill="hold" grpId="1" nodeType="clickEffect">
+                                  <p:stCondLst>
+                                    <p:cond delay="0"/>
+                                  </p:stCondLst>
+                                  <p:childTnLst>
+                                    <p:animEffect transition="out" filter="dissolve">
+                                      <p:cBhvr>
+                                        <p:cTn id="26" dur="500"/>
+                                        <p:tgtEl>
+                                          <p:spTgt spid="3">
+                                            <p:txEl>
+                                              <p:pRg st="1" end="1"/>
+                                            </p:txEl>
+                                          </p:spTgt>
+                                        </p:tgtEl>
+                                      </p:cBhvr>
+                                    </p:animEffect>
+                                    <p:set>
+                                      <p:cBhvr>
+                                        <p:cTn id="27" dur="1" fill="hold">
+                                          <p:stCondLst>
+                                            <p:cond delay="499"/>
+                                          </p:stCondLst>
+                                        </p:cTn>
+                                        <p:tgtEl>
+                                          <p:spTgt spid="3">
+                                            <p:txEl>
+                                              <p:pRg st="1" end="1"/>
+                                            </p:txEl>
+                                          </p:spTgt>
+                                        </p:tgtEl>
+                                        <p:attrNameLst>
+                                          <p:attrName>style.visibility</p:attrName>
+                                        </p:attrNameLst>
+                                      </p:cBhvr>
+                                      <p:to>
+                                        <p:strVal val="hidden"/>
+                                      </p:to>
+                                    </p:set>
+                                  </p:childTnLst>
+                                </p:cTn>
+                              </p:par>
+                            </p:childTnLst>
+                          </p:cTn>
+                        </p:par>
+                      </p:childTnLst>
+                    </p:cTn>
+                  </p:par>
+                  <p:par>
+                    <p:cTn id="28" fill="hold">
+                      <p:stCondLst>
+                        <p:cond delay="indefinite"/>
+                      </p:stCondLst>
+                      <p:childTnLst>
+                        <p:par>
+                          <p:cTn id="29" fill="hold">
+                            <p:stCondLst>
+                              <p:cond delay="0"/>
+                            </p:stCondLst>
+                            <p:childTnLst>
+                              <p:par>
+                                <p:cTn id="30" presetID="9" presetClass="exit" presetSubtype="0" fill="hold" grpId="1" nodeType="clickEffect">
+                                  <p:stCondLst>
+                                    <p:cond delay="0"/>
+                                  </p:stCondLst>
+                                  <p:childTnLst>
+                                    <p:animEffect transition="out" filter="dissolve">
+                                      <p:cBhvr>
+                                        <p:cTn id="31" dur="500"/>
+                                        <p:tgtEl>
+                                          <p:spTgt spid="3">
+                                            <p:txEl>
+                                              <p:pRg st="2" end="2"/>
+                                            </p:txEl>
+                                          </p:spTgt>
+                                        </p:tgtEl>
+                                      </p:cBhvr>
+                                    </p:animEffect>
+                                    <p:set>
+                                      <p:cBhvr>
+                                        <p:cTn id="32" dur="1" fill="hold">
+                                          <p:stCondLst>
+                                            <p:cond delay="499"/>
+                                          </p:stCondLst>
+                                        </p:cTn>
+                                        <p:tgtEl>
+                                          <p:spTgt spid="3">
+                                            <p:txEl>
+                                              <p:pRg st="2" end="2"/>
+                                            </p:txEl>
+                                          </p:spTgt>
+                                        </p:tgtEl>
+                                        <p:attrNameLst>
+                                          <p:attrName>style.visibility</p:attrName>
+                                        </p:attrNameLst>
+                                      </p:cBhvr>
+                                      <p:to>
+                                        <p:strVal val="hidden"/>
+                                      </p:to>
+                                    </p:set>
+                                  </p:childTnLst>
+                                </p:cTn>
+                              </p:par>
+                            </p:childTnLst>
+                          </p:cTn>
+                        </p:par>
+                      </p:childTnLst>
+                    </p:cTn>
+                  </p:par>
+                </p:childTnLst>
+              </p:cTn>
+              <p:prevCondLst>
+                <p:cond evt="onPrev" delay="0">
+                  <p:tgtEl>
+                    <p:sldTgt/>
+                  </p:tgtEl>
+                </p:cond>
+              </p:prevCondLst>
+              <p:nextCondLst>
+                <p:cond evt="onNext" delay="0">
+                  <p:tgtEl>
+                    <p:sldTgt/>
+                  </p:tgtEl>
+                </p:cond>
+              </p:nextCondLst>
+            </p:seq>
+          </p:childTnLst>
+        </p:cTn>
+      </p:par>
+    </p:tnLst>
+    <p:bldLst>
+      <p:bldP spid="3" grpId="0" uiExpand="1" build="p"/>
+      <p:bldP spid="3" grpId="1" uiExpand="1" build="p"/>
+    </p:bldLst>
+  </p:timing>
+</p:sld>
+</file>
+
+<file path=ppt/slides/slide9.xml><?xml version="1.0" encoding="utf-8"?>
 <p:sld xmlns:a="http://schemas.openxmlformats.org/drawingml/2006/main" xmlns:r="http://schemas.openxmlformats.org/officeDocument/2006/relationships" xmlns:p="http://schemas.openxmlformats.org/presentationml/2006/main">
   <p:cSld>
     <p:spTree>

</xml_diff>